<commit_message>
calculated more stats, and updated presentation
</commit_message>
<xml_diff>
--- a/SpaceTag.pptx
+++ b/SpaceTag.pptx
@@ -13,106 +13,83 @@
     <p:sldId id="258" r:id="rId10"/>
     <p:sldId id="259" r:id="rId11"/>
     <p:sldId id="260" r:id="rId12"/>
+    <p:sldId id="261" r:id="rId13"/>
+    <p:sldId id="262" r:id="rId14"/>
+    <p:sldId id="263" r:id="rId15"/>
+    <p:sldId id="264" r:id="rId16"/>
   </p:sldIdLst>
   <p:sldSz cx="13004800" cy="9753600"/>
   <p:notesSz cx="6858000" cy="9144000"/>
   <p:defaultTextStyle>
     <a:lvl1pPr algn="ctr" defTabSz="584200">
       <a:defRPr sz="3600">
-        <a:solidFill>
-          <a:srgbClr val="FFFFFF"/>
-        </a:solidFill>
-        <a:latin typeface="+mn-lt"/>
-        <a:ea typeface="+mn-ea"/>
-        <a:cs typeface="+mn-cs"/>
+        <a:latin typeface="Helvetica Light"/>
+        <a:ea typeface="Helvetica Light"/>
+        <a:cs typeface="Helvetica Light"/>
         <a:sym typeface="Helvetica Light"/>
       </a:defRPr>
     </a:lvl1pPr>
-    <a:lvl2pPr indent="228600" algn="ctr" defTabSz="584200">
+    <a:lvl2pPr algn="ctr" defTabSz="584200">
       <a:defRPr sz="3600">
-        <a:solidFill>
-          <a:srgbClr val="FFFFFF"/>
-        </a:solidFill>
-        <a:latin typeface="+mn-lt"/>
-        <a:ea typeface="+mn-ea"/>
-        <a:cs typeface="+mn-cs"/>
+        <a:latin typeface="Helvetica Light"/>
+        <a:ea typeface="Helvetica Light"/>
+        <a:cs typeface="Helvetica Light"/>
         <a:sym typeface="Helvetica Light"/>
       </a:defRPr>
     </a:lvl2pPr>
-    <a:lvl3pPr indent="457200" algn="ctr" defTabSz="584200">
+    <a:lvl3pPr algn="ctr" defTabSz="584200">
       <a:defRPr sz="3600">
-        <a:solidFill>
-          <a:srgbClr val="FFFFFF"/>
-        </a:solidFill>
-        <a:latin typeface="+mn-lt"/>
-        <a:ea typeface="+mn-ea"/>
-        <a:cs typeface="+mn-cs"/>
+        <a:latin typeface="Helvetica Light"/>
+        <a:ea typeface="Helvetica Light"/>
+        <a:cs typeface="Helvetica Light"/>
         <a:sym typeface="Helvetica Light"/>
       </a:defRPr>
     </a:lvl3pPr>
-    <a:lvl4pPr indent="685800" algn="ctr" defTabSz="584200">
+    <a:lvl4pPr algn="ctr" defTabSz="584200">
       <a:defRPr sz="3600">
-        <a:solidFill>
-          <a:srgbClr val="FFFFFF"/>
-        </a:solidFill>
-        <a:latin typeface="+mn-lt"/>
-        <a:ea typeface="+mn-ea"/>
-        <a:cs typeface="+mn-cs"/>
+        <a:latin typeface="Helvetica Light"/>
+        <a:ea typeface="Helvetica Light"/>
+        <a:cs typeface="Helvetica Light"/>
         <a:sym typeface="Helvetica Light"/>
       </a:defRPr>
     </a:lvl4pPr>
-    <a:lvl5pPr indent="914400" algn="ctr" defTabSz="584200">
+    <a:lvl5pPr algn="ctr" defTabSz="584200">
       <a:defRPr sz="3600">
-        <a:solidFill>
-          <a:srgbClr val="FFFFFF"/>
-        </a:solidFill>
-        <a:latin typeface="+mn-lt"/>
-        <a:ea typeface="+mn-ea"/>
-        <a:cs typeface="+mn-cs"/>
+        <a:latin typeface="Helvetica Light"/>
+        <a:ea typeface="Helvetica Light"/>
+        <a:cs typeface="Helvetica Light"/>
         <a:sym typeface="Helvetica Light"/>
       </a:defRPr>
     </a:lvl5pPr>
-    <a:lvl6pPr indent="1143000" algn="ctr" defTabSz="584200">
+    <a:lvl6pPr algn="ctr" defTabSz="584200">
       <a:defRPr sz="3600">
-        <a:solidFill>
-          <a:srgbClr val="FFFFFF"/>
-        </a:solidFill>
-        <a:latin typeface="+mn-lt"/>
-        <a:ea typeface="+mn-ea"/>
-        <a:cs typeface="+mn-cs"/>
+        <a:latin typeface="Helvetica Light"/>
+        <a:ea typeface="Helvetica Light"/>
+        <a:cs typeface="Helvetica Light"/>
         <a:sym typeface="Helvetica Light"/>
       </a:defRPr>
     </a:lvl6pPr>
-    <a:lvl7pPr indent="1371600" algn="ctr" defTabSz="584200">
+    <a:lvl7pPr algn="ctr" defTabSz="584200">
       <a:defRPr sz="3600">
-        <a:solidFill>
-          <a:srgbClr val="FFFFFF"/>
-        </a:solidFill>
-        <a:latin typeface="+mn-lt"/>
-        <a:ea typeface="+mn-ea"/>
-        <a:cs typeface="+mn-cs"/>
+        <a:latin typeface="Helvetica Light"/>
+        <a:ea typeface="Helvetica Light"/>
+        <a:cs typeface="Helvetica Light"/>
         <a:sym typeface="Helvetica Light"/>
       </a:defRPr>
     </a:lvl7pPr>
-    <a:lvl8pPr indent="1600200" algn="ctr" defTabSz="584200">
+    <a:lvl8pPr algn="ctr" defTabSz="584200">
       <a:defRPr sz="3600">
-        <a:solidFill>
-          <a:srgbClr val="FFFFFF"/>
-        </a:solidFill>
-        <a:latin typeface="+mn-lt"/>
-        <a:ea typeface="+mn-ea"/>
-        <a:cs typeface="+mn-cs"/>
+        <a:latin typeface="Helvetica Light"/>
+        <a:ea typeface="Helvetica Light"/>
+        <a:cs typeface="Helvetica Light"/>
         <a:sym typeface="Helvetica Light"/>
       </a:defRPr>
     </a:lvl8pPr>
-    <a:lvl9pPr indent="1828800" algn="ctr" defTabSz="584200">
+    <a:lvl9pPr algn="ctr" defTabSz="584200">
       <a:defRPr sz="3600">
-        <a:solidFill>
-          <a:srgbClr val="FFFFFF"/>
-        </a:solidFill>
-        <a:latin typeface="+mn-lt"/>
-        <a:ea typeface="+mn-ea"/>
-        <a:cs typeface="+mn-cs"/>
+        <a:latin typeface="Helvetica Light"/>
+        <a:ea typeface="Helvetica Light"/>
+        <a:cs typeface="Helvetica Light"/>
         <a:sym typeface="Helvetica Light"/>
       </a:defRPr>
     </a:lvl9pPr>
@@ -200,9 +177,9 @@
         <a:spcPct val="125000"/>
       </a:lnSpc>
       <a:defRPr sz="2400">
-        <a:latin typeface="Avenir Roman"/>
-        <a:ea typeface="Avenir Roman"/>
-        <a:cs typeface="Avenir Roman"/>
+        <a:latin typeface="+mn-lt"/>
+        <a:ea typeface="+mn-ea"/>
+        <a:cs typeface="+mn-cs"/>
         <a:sym typeface="Avenir Roman"/>
       </a:defRPr>
     </a:lvl1pPr>
@@ -211,9 +188,9 @@
         <a:spcPct val="125000"/>
       </a:lnSpc>
       <a:defRPr sz="2400">
-        <a:latin typeface="Avenir Roman"/>
-        <a:ea typeface="Avenir Roman"/>
-        <a:cs typeface="Avenir Roman"/>
+        <a:latin typeface="+mn-lt"/>
+        <a:ea typeface="+mn-ea"/>
+        <a:cs typeface="+mn-cs"/>
         <a:sym typeface="Avenir Roman"/>
       </a:defRPr>
     </a:lvl2pPr>
@@ -222,9 +199,9 @@
         <a:spcPct val="125000"/>
       </a:lnSpc>
       <a:defRPr sz="2400">
-        <a:latin typeface="Avenir Roman"/>
-        <a:ea typeface="Avenir Roman"/>
-        <a:cs typeface="Avenir Roman"/>
+        <a:latin typeface="+mn-lt"/>
+        <a:ea typeface="+mn-ea"/>
+        <a:cs typeface="+mn-cs"/>
         <a:sym typeface="Avenir Roman"/>
       </a:defRPr>
     </a:lvl3pPr>
@@ -233,9 +210,9 @@
         <a:spcPct val="125000"/>
       </a:lnSpc>
       <a:defRPr sz="2400">
-        <a:latin typeface="Avenir Roman"/>
-        <a:ea typeface="Avenir Roman"/>
-        <a:cs typeface="Avenir Roman"/>
+        <a:latin typeface="+mn-lt"/>
+        <a:ea typeface="+mn-ea"/>
+        <a:cs typeface="+mn-cs"/>
         <a:sym typeface="Avenir Roman"/>
       </a:defRPr>
     </a:lvl4pPr>
@@ -244,9 +221,9 @@
         <a:spcPct val="125000"/>
       </a:lnSpc>
       <a:defRPr sz="2400">
-        <a:latin typeface="Avenir Roman"/>
-        <a:ea typeface="Avenir Roman"/>
-        <a:cs typeface="Avenir Roman"/>
+        <a:latin typeface="+mn-lt"/>
+        <a:ea typeface="+mn-ea"/>
+        <a:cs typeface="+mn-cs"/>
         <a:sym typeface="Avenir Roman"/>
       </a:defRPr>
     </a:lvl5pPr>
@@ -255,9 +232,9 @@
         <a:spcPct val="125000"/>
       </a:lnSpc>
       <a:defRPr sz="2400">
-        <a:latin typeface="Avenir Roman"/>
-        <a:ea typeface="Avenir Roman"/>
-        <a:cs typeface="Avenir Roman"/>
+        <a:latin typeface="+mn-lt"/>
+        <a:ea typeface="+mn-ea"/>
+        <a:cs typeface="+mn-cs"/>
         <a:sym typeface="Avenir Roman"/>
       </a:defRPr>
     </a:lvl6pPr>
@@ -266,9 +243,9 @@
         <a:spcPct val="125000"/>
       </a:lnSpc>
       <a:defRPr sz="2400">
-        <a:latin typeface="Avenir Roman"/>
-        <a:ea typeface="Avenir Roman"/>
-        <a:cs typeface="Avenir Roman"/>
+        <a:latin typeface="+mn-lt"/>
+        <a:ea typeface="+mn-ea"/>
+        <a:cs typeface="+mn-cs"/>
         <a:sym typeface="Avenir Roman"/>
       </a:defRPr>
     </a:lvl7pPr>
@@ -277,9 +254,9 @@
         <a:spcPct val="125000"/>
       </a:lnSpc>
       <a:defRPr sz="2400">
-        <a:latin typeface="Avenir Roman"/>
-        <a:ea typeface="Avenir Roman"/>
-        <a:cs typeface="Avenir Roman"/>
+        <a:latin typeface="+mn-lt"/>
+        <a:ea typeface="+mn-ea"/>
+        <a:cs typeface="+mn-cs"/>
         <a:sym typeface="Avenir Roman"/>
       </a:defRPr>
     </a:lvl8pPr>
@@ -288,9 +265,9 @@
         <a:spcPct val="125000"/>
       </a:lnSpc>
       <a:defRPr sz="2400">
-        <a:latin typeface="Avenir Roman"/>
-        <a:ea typeface="Avenir Roman"/>
-        <a:cs typeface="Avenir Roman"/>
+        <a:latin typeface="+mn-lt"/>
+        <a:ea typeface="+mn-ea"/>
+        <a:cs typeface="+mn-cs"/>
         <a:sym typeface="Avenir Roman"/>
       </a:defRPr>
     </a:lvl9pPr>
@@ -325,8 +302,8 @@
         </p:nvSpPr>
         <p:spPr>
           <a:xfrm>
-            <a:off x="1270000" y="1638300"/>
-            <a:ext cx="10464800" cy="3302000"/>
+            <a:off x="1270000" y="0"/>
+            <a:ext cx="10464800" cy="4940300"/>
           </a:xfrm>
           <a:prstGeom prst="rect">
             <a:avLst/>
@@ -365,7 +342,7 @@
         <p:spPr>
           <a:xfrm>
             <a:off x="1270000" y="5029200"/>
-            <a:ext cx="10464800" cy="1130300"/>
+            <a:ext cx="10464800" cy="3568700"/>
           </a:xfrm>
           <a:prstGeom prst="rect">
             <a:avLst/>
@@ -382,7 +359,7 @@
               <a:buNone/>
               <a:defRPr sz="3200"/>
             </a:lvl1pPr>
-            <a:lvl2pPr marL="0" indent="228600" algn="ctr">
+            <a:lvl2pPr marL="0" indent="0" algn="ctr">
               <a:spcBef>
                 <a:spcPts val="0"/>
               </a:spcBef>
@@ -390,7 +367,7 @@
               <a:buNone/>
               <a:defRPr sz="3200"/>
             </a:lvl2pPr>
-            <a:lvl3pPr marL="0" indent="457200" algn="ctr">
+            <a:lvl3pPr marL="0" indent="0" algn="ctr">
               <a:spcBef>
                 <a:spcPts val="0"/>
               </a:spcBef>
@@ -398,7 +375,7 @@
               <a:buNone/>
               <a:defRPr sz="3200"/>
             </a:lvl3pPr>
-            <a:lvl4pPr marL="0" indent="685800" algn="ctr">
+            <a:lvl4pPr marL="0" indent="0" algn="ctr">
               <a:spcBef>
                 <a:spcPts val="0"/>
               </a:spcBef>
@@ -406,7 +383,7 @@
               <a:buNone/>
               <a:defRPr sz="3200"/>
             </a:lvl4pPr>
-            <a:lvl5pPr marL="0" indent="914400" algn="ctr">
+            <a:lvl5pPr marL="0" indent="0" algn="ctr">
               <a:spcBef>
                 <a:spcPts val="0"/>
               </a:spcBef>
@@ -636,8 +613,8 @@
         </p:nvSpPr>
         <p:spPr>
           <a:xfrm>
-            <a:off x="1270000" y="6718300"/>
-            <a:ext cx="10464800" cy="1422400"/>
+            <a:off x="1270000" y="6667500"/>
+            <a:ext cx="10464800" cy="1524000"/>
           </a:xfrm>
           <a:prstGeom prst="rect">
             <a:avLst/>
@@ -676,7 +653,7 @@
         <p:spPr>
           <a:xfrm>
             <a:off x="1270000" y="8191500"/>
-            <a:ext cx="10464800" cy="1130300"/>
+            <a:ext cx="10464800" cy="1562100"/>
           </a:xfrm>
           <a:prstGeom prst="rect">
             <a:avLst/>
@@ -693,7 +670,7 @@
               <a:buNone/>
               <a:defRPr sz="3200"/>
             </a:lvl1pPr>
-            <a:lvl2pPr marL="0" indent="228600" algn="ctr">
+            <a:lvl2pPr marL="0" indent="0" algn="ctr">
               <a:spcBef>
                 <a:spcPts val="0"/>
               </a:spcBef>
@@ -701,7 +678,7 @@
               <a:buNone/>
               <a:defRPr sz="3200"/>
             </a:lvl2pPr>
-            <a:lvl3pPr marL="0" indent="457200" algn="ctr">
+            <a:lvl3pPr marL="0" indent="0" algn="ctr">
               <a:spcBef>
                 <a:spcPts val="0"/>
               </a:spcBef>
@@ -709,7 +686,7 @@
               <a:buNone/>
               <a:defRPr sz="3200"/>
             </a:lvl3pPr>
-            <a:lvl4pPr marL="0" indent="685800" algn="ctr">
+            <a:lvl4pPr marL="0" indent="0" algn="ctr">
               <a:spcBef>
                 <a:spcPts val="0"/>
               </a:spcBef>
@@ -717,7 +694,7 @@
               <a:buNone/>
               <a:defRPr sz="3200"/>
             </a:lvl4pPr>
-            <a:lvl5pPr marL="0" indent="914400" algn="ctr">
+            <a:lvl5pPr marL="0" indent="0" algn="ctr">
               <a:spcBef>
                 <a:spcPts val="0"/>
               </a:spcBef>
@@ -934,8 +911,8 @@
         </p:nvSpPr>
         <p:spPr>
           <a:xfrm>
-            <a:off x="952500" y="635000"/>
-            <a:ext cx="5334000" cy="3987800"/>
+            <a:off x="952500" y="0"/>
+            <a:ext cx="5334000" cy="4622800"/>
           </a:xfrm>
           <a:prstGeom prst="rect">
             <a:avLst/>
@@ -978,7 +955,7 @@
         <p:spPr>
           <a:xfrm>
             <a:off x="952500" y="4762500"/>
-            <a:ext cx="5334000" cy="4114800"/>
+            <a:ext cx="5334000" cy="4991100"/>
           </a:xfrm>
           <a:prstGeom prst="rect">
             <a:avLst/>
@@ -995,7 +972,7 @@
               <a:buNone/>
               <a:defRPr sz="3200"/>
             </a:lvl1pPr>
-            <a:lvl2pPr marL="0" indent="228600" algn="ctr">
+            <a:lvl2pPr marL="0" indent="0" algn="ctr">
               <a:spcBef>
                 <a:spcPts val="0"/>
               </a:spcBef>
@@ -1003,7 +980,7 @@
               <a:buNone/>
               <a:defRPr sz="3200"/>
             </a:lvl2pPr>
-            <a:lvl3pPr marL="0" indent="457200" algn="ctr">
+            <a:lvl3pPr marL="0" indent="0" algn="ctr">
               <a:spcBef>
                 <a:spcPts val="0"/>
               </a:spcBef>
@@ -1011,7 +988,7 @@
               <a:buNone/>
               <a:defRPr sz="3200"/>
             </a:lvl3pPr>
-            <a:lvl4pPr marL="0" indent="685800" algn="ctr">
+            <a:lvl4pPr marL="0" indent="0" algn="ctr">
               <a:spcBef>
                 <a:spcPts val="0"/>
               </a:spcBef>
@@ -1019,7 +996,7 @@
               <a:buNone/>
               <a:defRPr sz="3200"/>
             </a:lvl4pPr>
-            <a:lvl5pPr marL="0" indent="914400" algn="ctr">
+            <a:lvl5pPr marL="0" indent="0" algn="ctr">
               <a:spcBef>
                 <a:spcPts val="0"/>
               </a:spcBef>
@@ -1170,6 +1147,10 @@
           </p:nvPr>
         </p:nvSpPr>
         <p:spPr>
+          <a:xfrm>
+            <a:off x="952500" y="0"/>
+            <a:ext cx="11099800" cy="2667000"/>
+          </a:xfrm>
           <a:prstGeom prst="rect">
             <a:avLst/>
           </a:prstGeom>
@@ -1451,8 +1432,8 @@
         </p:nvSpPr>
         <p:spPr>
           <a:xfrm>
-            <a:off x="952500" y="2590800"/>
-            <a:ext cx="5334000" cy="6286500"/>
+            <a:off x="952500" y="2452955"/>
+            <a:ext cx="5334000" cy="6562190"/>
           </a:xfrm>
           <a:prstGeom prst="rect">
             <a:avLst/>
@@ -1821,8 +1802,8 @@
         </p:nvSpPr>
         <p:spPr>
           <a:xfrm>
-            <a:off x="952500" y="254000"/>
-            <a:ext cx="11099800" cy="2159000"/>
+            <a:off x="952500" y="214044"/>
+            <a:ext cx="11099800" cy="2238912"/>
           </a:xfrm>
           <a:prstGeom prst="rect">
             <a:avLst/>
@@ -1870,8 +1851,8 @@
         </p:nvSpPr>
         <p:spPr>
           <a:xfrm>
-            <a:off x="952500" y="2590800"/>
-            <a:ext cx="11099800" cy="6286500"/>
+            <a:off x="952500" y="2452955"/>
+            <a:ext cx="11099800" cy="6562190"/>
           </a:xfrm>
           <a:prstGeom prst="rect">
             <a:avLst/>
@@ -1999,7 +1980,7 @@
       </p:sp>
     </p:spTree>
   </p:cSld>
-  <p:clrMap bg1="dk1" tx1="lt1" bg2="dk2" tx2="lt2" accent1="accent1" accent2="accent2" accent3="accent3" accent4="accent4" accent5="accent5" accent6="accent6" hlink="hlink" folHlink="folHlink"/>
+  <p:clrMap bg1="lt1" tx1="dk1" bg2="lt2" tx2="dk2" accent1="accent1" accent2="accent2" accent3="accent3" accent4="accent4" accent5="accent5" accent6="accent6" hlink="hlink" folHlink="folHlink"/>
   <p:sldLayoutIdLst>
     <p:sldLayoutId id="2147483649" r:id="rId2"/>
     <p:sldLayoutId id="2147483650" r:id="rId3"/>
@@ -2022,97 +2003,97 @@
           <a:solidFill>
             <a:srgbClr val="FFFFFF"/>
           </a:solidFill>
-          <a:latin typeface="+mn-lt"/>
-          <a:ea typeface="+mn-ea"/>
-          <a:cs typeface="+mn-cs"/>
+          <a:latin typeface="Helvetica Light"/>
+          <a:ea typeface="Helvetica Light"/>
+          <a:cs typeface="Helvetica Light"/>
           <a:sym typeface="Helvetica Light"/>
         </a:defRPr>
       </a:lvl1pPr>
-      <a:lvl2pPr indent="228600" algn="ctr" defTabSz="584200">
+      <a:lvl2pPr algn="ctr" defTabSz="584200">
         <a:defRPr sz="8000">
           <a:solidFill>
             <a:srgbClr val="FFFFFF"/>
           </a:solidFill>
-          <a:latin typeface="+mn-lt"/>
-          <a:ea typeface="+mn-ea"/>
-          <a:cs typeface="+mn-cs"/>
+          <a:latin typeface="Helvetica Light"/>
+          <a:ea typeface="Helvetica Light"/>
+          <a:cs typeface="Helvetica Light"/>
           <a:sym typeface="Helvetica Light"/>
         </a:defRPr>
       </a:lvl2pPr>
-      <a:lvl3pPr indent="457200" algn="ctr" defTabSz="584200">
+      <a:lvl3pPr algn="ctr" defTabSz="584200">
         <a:defRPr sz="8000">
           <a:solidFill>
             <a:srgbClr val="FFFFFF"/>
           </a:solidFill>
-          <a:latin typeface="+mn-lt"/>
-          <a:ea typeface="+mn-ea"/>
-          <a:cs typeface="+mn-cs"/>
+          <a:latin typeface="Helvetica Light"/>
+          <a:ea typeface="Helvetica Light"/>
+          <a:cs typeface="Helvetica Light"/>
           <a:sym typeface="Helvetica Light"/>
         </a:defRPr>
       </a:lvl3pPr>
-      <a:lvl4pPr indent="685800" algn="ctr" defTabSz="584200">
+      <a:lvl4pPr algn="ctr" defTabSz="584200">
         <a:defRPr sz="8000">
           <a:solidFill>
             <a:srgbClr val="FFFFFF"/>
           </a:solidFill>
-          <a:latin typeface="+mn-lt"/>
-          <a:ea typeface="+mn-ea"/>
-          <a:cs typeface="+mn-cs"/>
+          <a:latin typeface="Helvetica Light"/>
+          <a:ea typeface="Helvetica Light"/>
+          <a:cs typeface="Helvetica Light"/>
           <a:sym typeface="Helvetica Light"/>
         </a:defRPr>
       </a:lvl4pPr>
-      <a:lvl5pPr indent="914400" algn="ctr" defTabSz="584200">
+      <a:lvl5pPr algn="ctr" defTabSz="584200">
         <a:defRPr sz="8000">
           <a:solidFill>
             <a:srgbClr val="FFFFFF"/>
           </a:solidFill>
-          <a:latin typeface="+mn-lt"/>
-          <a:ea typeface="+mn-ea"/>
-          <a:cs typeface="+mn-cs"/>
+          <a:latin typeface="Helvetica Light"/>
+          <a:ea typeface="Helvetica Light"/>
+          <a:cs typeface="Helvetica Light"/>
           <a:sym typeface="Helvetica Light"/>
         </a:defRPr>
       </a:lvl5pPr>
-      <a:lvl6pPr indent="1143000" algn="ctr" defTabSz="584200">
+      <a:lvl6pPr algn="ctr" defTabSz="584200">
         <a:defRPr sz="8000">
           <a:solidFill>
             <a:srgbClr val="FFFFFF"/>
           </a:solidFill>
-          <a:latin typeface="+mn-lt"/>
-          <a:ea typeface="+mn-ea"/>
-          <a:cs typeface="+mn-cs"/>
+          <a:latin typeface="Helvetica Light"/>
+          <a:ea typeface="Helvetica Light"/>
+          <a:cs typeface="Helvetica Light"/>
           <a:sym typeface="Helvetica Light"/>
         </a:defRPr>
       </a:lvl6pPr>
-      <a:lvl7pPr indent="1371600" algn="ctr" defTabSz="584200">
+      <a:lvl7pPr algn="ctr" defTabSz="584200">
         <a:defRPr sz="8000">
           <a:solidFill>
             <a:srgbClr val="FFFFFF"/>
           </a:solidFill>
-          <a:latin typeface="+mn-lt"/>
-          <a:ea typeface="+mn-ea"/>
-          <a:cs typeface="+mn-cs"/>
+          <a:latin typeface="Helvetica Light"/>
+          <a:ea typeface="Helvetica Light"/>
+          <a:cs typeface="Helvetica Light"/>
           <a:sym typeface="Helvetica Light"/>
         </a:defRPr>
       </a:lvl7pPr>
-      <a:lvl8pPr indent="1600200" algn="ctr" defTabSz="584200">
+      <a:lvl8pPr algn="ctr" defTabSz="584200">
         <a:defRPr sz="8000">
           <a:solidFill>
             <a:srgbClr val="FFFFFF"/>
           </a:solidFill>
-          <a:latin typeface="+mn-lt"/>
-          <a:ea typeface="+mn-ea"/>
-          <a:cs typeface="+mn-cs"/>
+          <a:latin typeface="Helvetica Light"/>
+          <a:ea typeface="Helvetica Light"/>
+          <a:cs typeface="Helvetica Light"/>
           <a:sym typeface="Helvetica Light"/>
         </a:defRPr>
       </a:lvl8pPr>
-      <a:lvl9pPr indent="1828800" algn="ctr" defTabSz="584200">
+      <a:lvl9pPr algn="ctr" defTabSz="584200">
         <a:defRPr sz="8000">
           <a:solidFill>
             <a:srgbClr val="FFFFFF"/>
           </a:solidFill>
-          <a:latin typeface="+mn-lt"/>
-          <a:ea typeface="+mn-ea"/>
-          <a:cs typeface="+mn-cs"/>
+          <a:latin typeface="Helvetica Light"/>
+          <a:ea typeface="Helvetica Light"/>
+          <a:cs typeface="Helvetica Light"/>
           <a:sym typeface="Helvetica Light"/>
         </a:defRPr>
       </a:lvl9pPr>
@@ -2128,9 +2109,9 @@
           <a:solidFill>
             <a:srgbClr val="FFFFFF"/>
           </a:solidFill>
-          <a:latin typeface="+mn-lt"/>
-          <a:ea typeface="+mn-ea"/>
-          <a:cs typeface="+mn-cs"/>
+          <a:latin typeface="Helvetica Light"/>
+          <a:ea typeface="Helvetica Light"/>
+          <a:cs typeface="Helvetica Light"/>
           <a:sym typeface="Helvetica Light"/>
         </a:defRPr>
       </a:lvl1pPr>
@@ -2144,9 +2125,9 @@
           <a:solidFill>
             <a:srgbClr val="FFFFFF"/>
           </a:solidFill>
-          <a:latin typeface="+mn-lt"/>
-          <a:ea typeface="+mn-ea"/>
-          <a:cs typeface="+mn-cs"/>
+          <a:latin typeface="Helvetica Light"/>
+          <a:ea typeface="Helvetica Light"/>
+          <a:cs typeface="Helvetica Light"/>
           <a:sym typeface="Helvetica Light"/>
         </a:defRPr>
       </a:lvl2pPr>
@@ -2160,9 +2141,9 @@
           <a:solidFill>
             <a:srgbClr val="FFFFFF"/>
           </a:solidFill>
-          <a:latin typeface="+mn-lt"/>
-          <a:ea typeface="+mn-ea"/>
-          <a:cs typeface="+mn-cs"/>
+          <a:latin typeface="Helvetica Light"/>
+          <a:ea typeface="Helvetica Light"/>
+          <a:cs typeface="Helvetica Light"/>
           <a:sym typeface="Helvetica Light"/>
         </a:defRPr>
       </a:lvl3pPr>
@@ -2176,9 +2157,9 @@
           <a:solidFill>
             <a:srgbClr val="FFFFFF"/>
           </a:solidFill>
-          <a:latin typeface="+mn-lt"/>
-          <a:ea typeface="+mn-ea"/>
-          <a:cs typeface="+mn-cs"/>
+          <a:latin typeface="Helvetica Light"/>
+          <a:ea typeface="Helvetica Light"/>
+          <a:cs typeface="Helvetica Light"/>
           <a:sym typeface="Helvetica Light"/>
         </a:defRPr>
       </a:lvl4pPr>
@@ -2192,9 +2173,9 @@
           <a:solidFill>
             <a:srgbClr val="FFFFFF"/>
           </a:solidFill>
-          <a:latin typeface="+mn-lt"/>
-          <a:ea typeface="+mn-ea"/>
-          <a:cs typeface="+mn-cs"/>
+          <a:latin typeface="Helvetica Light"/>
+          <a:ea typeface="Helvetica Light"/>
+          <a:cs typeface="Helvetica Light"/>
           <a:sym typeface="Helvetica Light"/>
         </a:defRPr>
       </a:lvl5pPr>
@@ -2208,9 +2189,9 @@
           <a:solidFill>
             <a:srgbClr val="FFFFFF"/>
           </a:solidFill>
-          <a:latin typeface="+mn-lt"/>
-          <a:ea typeface="+mn-ea"/>
-          <a:cs typeface="+mn-cs"/>
+          <a:latin typeface="Helvetica Light"/>
+          <a:ea typeface="Helvetica Light"/>
+          <a:cs typeface="Helvetica Light"/>
           <a:sym typeface="Helvetica Light"/>
         </a:defRPr>
       </a:lvl6pPr>
@@ -2224,9 +2205,9 @@
           <a:solidFill>
             <a:srgbClr val="FFFFFF"/>
           </a:solidFill>
-          <a:latin typeface="+mn-lt"/>
-          <a:ea typeface="+mn-ea"/>
-          <a:cs typeface="+mn-cs"/>
+          <a:latin typeface="Helvetica Light"/>
+          <a:ea typeface="Helvetica Light"/>
+          <a:cs typeface="Helvetica Light"/>
           <a:sym typeface="Helvetica Light"/>
         </a:defRPr>
       </a:lvl7pPr>
@@ -2240,9 +2221,9 @@
           <a:solidFill>
             <a:srgbClr val="FFFFFF"/>
           </a:solidFill>
-          <a:latin typeface="+mn-lt"/>
-          <a:ea typeface="+mn-ea"/>
-          <a:cs typeface="+mn-cs"/>
+          <a:latin typeface="Helvetica Light"/>
+          <a:ea typeface="Helvetica Light"/>
+          <a:cs typeface="Helvetica Light"/>
           <a:sym typeface="Helvetica Light"/>
         </a:defRPr>
       </a:lvl8pPr>
@@ -2256,16 +2237,16 @@
           <a:solidFill>
             <a:srgbClr val="FFFFFF"/>
           </a:solidFill>
-          <a:latin typeface="+mn-lt"/>
-          <a:ea typeface="+mn-ea"/>
-          <a:cs typeface="+mn-cs"/>
+          <a:latin typeface="Helvetica Light"/>
+          <a:ea typeface="Helvetica Light"/>
+          <a:cs typeface="Helvetica Light"/>
           <a:sym typeface="Helvetica Light"/>
         </a:defRPr>
       </a:lvl9pPr>
     </p:bodyStyle>
     <p:otherStyle>
-      <a:lvl1pPr algn="ctr" defTabSz="584200">
-        <a:defRPr>
+      <a:lvl1pPr algn="r" defTabSz="584200">
+        <a:defRPr sz="1200">
           <a:solidFill>
             <a:schemeClr val="tx1"/>
           </a:solidFill>
@@ -2275,8 +2256,8 @@
           <a:sym typeface="Helvetica Light"/>
         </a:defRPr>
       </a:lvl1pPr>
-      <a:lvl2pPr indent="228600" algn="ctr" defTabSz="584200">
-        <a:defRPr>
+      <a:lvl2pPr algn="r" defTabSz="584200">
+        <a:defRPr sz="1200">
           <a:solidFill>
             <a:schemeClr val="tx1"/>
           </a:solidFill>
@@ -2286,8 +2267,8 @@
           <a:sym typeface="Helvetica Light"/>
         </a:defRPr>
       </a:lvl2pPr>
-      <a:lvl3pPr indent="457200" algn="ctr" defTabSz="584200">
-        <a:defRPr>
+      <a:lvl3pPr algn="r" defTabSz="584200">
+        <a:defRPr sz="1200">
           <a:solidFill>
             <a:schemeClr val="tx1"/>
           </a:solidFill>
@@ -2297,8 +2278,8 @@
           <a:sym typeface="Helvetica Light"/>
         </a:defRPr>
       </a:lvl3pPr>
-      <a:lvl4pPr indent="685800" algn="ctr" defTabSz="584200">
-        <a:defRPr>
+      <a:lvl4pPr algn="r" defTabSz="584200">
+        <a:defRPr sz="1200">
           <a:solidFill>
             <a:schemeClr val="tx1"/>
           </a:solidFill>
@@ -2308,8 +2289,8 @@
           <a:sym typeface="Helvetica Light"/>
         </a:defRPr>
       </a:lvl4pPr>
-      <a:lvl5pPr indent="914400" algn="ctr" defTabSz="584200">
-        <a:defRPr>
+      <a:lvl5pPr algn="r" defTabSz="584200">
+        <a:defRPr sz="1200">
           <a:solidFill>
             <a:schemeClr val="tx1"/>
           </a:solidFill>
@@ -2319,8 +2300,8 @@
           <a:sym typeface="Helvetica Light"/>
         </a:defRPr>
       </a:lvl5pPr>
-      <a:lvl6pPr indent="1143000" algn="ctr" defTabSz="584200">
-        <a:defRPr>
+      <a:lvl6pPr algn="r" defTabSz="584200">
+        <a:defRPr sz="1200">
           <a:solidFill>
             <a:schemeClr val="tx1"/>
           </a:solidFill>
@@ -2330,8 +2311,8 @@
           <a:sym typeface="Helvetica Light"/>
         </a:defRPr>
       </a:lvl6pPr>
-      <a:lvl7pPr indent="1371600" algn="ctr" defTabSz="584200">
-        <a:defRPr>
+      <a:lvl7pPr algn="r" defTabSz="584200">
+        <a:defRPr sz="1200">
           <a:solidFill>
             <a:schemeClr val="tx1"/>
           </a:solidFill>
@@ -2341,8 +2322,8 @@
           <a:sym typeface="Helvetica Light"/>
         </a:defRPr>
       </a:lvl7pPr>
-      <a:lvl8pPr indent="1600200" algn="ctr" defTabSz="584200">
-        <a:defRPr>
+      <a:lvl8pPr algn="r" defTabSz="584200">
+        <a:defRPr sz="1200">
           <a:solidFill>
             <a:schemeClr val="tx1"/>
           </a:solidFill>
@@ -2352,8 +2333,8 @@
           <a:sym typeface="Helvetica Light"/>
         </a:defRPr>
       </a:lvl8pPr>
-      <a:lvl9pPr indent="1828800" algn="ctr" defTabSz="584200">
-        <a:defRPr>
+      <a:lvl9pPr algn="r" defTabSz="584200">
+        <a:defRPr sz="1200">
           <a:solidFill>
             <a:schemeClr val="tx1"/>
           </a:solidFill>
@@ -2395,8 +2376,8 @@
         </p:nvSpPr>
         <p:spPr>
           <a:xfrm>
-            <a:off x="1269999" y="761999"/>
-            <a:ext cx="10464801" cy="3302001"/>
+            <a:off x="1269999" y="761998"/>
+            <a:ext cx="10464801" cy="3302003"/>
           </a:xfrm>
           <a:prstGeom prst="rect">
             <a:avLst/>
@@ -2446,8 +2427,8 @@
         </p:nvSpPr>
         <p:spPr>
           <a:xfrm>
-            <a:off x="1269999" y="4152899"/>
-            <a:ext cx="10464801" cy="1130301"/>
+            <a:off x="1269999" y="4152898"/>
+            <a:ext cx="10464801" cy="1130302"/>
           </a:xfrm>
           <a:prstGeom prst="rect">
             <a:avLst/>
@@ -2486,7 +2467,7 @@
       </p:sp>
       <p:pic>
         <p:nvPicPr>
-          <p:cNvPr id="34" name="spaceappslogo.png"/>
+          <p:cNvPr id="34" name="image2.png"/>
           <p:cNvPicPr/>
           <p:nvPr/>
         </p:nvPicPr>
@@ -2500,8 +2481,8 @@
         </p:blipFill>
         <p:spPr>
           <a:xfrm>
-            <a:off x="4840089" y="5912511"/>
-            <a:ext cx="3324622" cy="3324623"/>
+            <a:off x="4840089" y="5912510"/>
+            <a:ext cx="3324622" cy="3324624"/>
           </a:xfrm>
           <a:prstGeom prst="rect">
             <a:avLst/>
@@ -2546,6 +2527,10 @@
           </p:nvPr>
         </p:nvSpPr>
         <p:spPr>
+          <a:xfrm>
+            <a:off x="952500" y="254000"/>
+            <a:ext cx="11099800" cy="2159000"/>
+          </a:xfrm>
           <a:prstGeom prst="rect">
             <a:avLst/>
           </a:prstGeom>
@@ -2579,7 +2564,7 @@
                   <a:srgbClr val="FFFB00"/>
                 </a:solidFill>
               </a:rPr>
-              <a:t>Impact</a:t>
+              <a:t>Challenge</a:t>
             </a:r>
           </a:p>
         </p:txBody>
@@ -2593,7 +2578,7 @@
         <p:spPr>
           <a:xfrm>
             <a:off x="8913151" y="9215966"/>
-            <a:ext cx="5865416" cy="554899"/>
+            <a:ext cx="5865417" cy="554900"/>
           </a:xfrm>
           <a:prstGeom prst="rect">
             <a:avLst/>
@@ -2652,6 +2637,10 @@
           </p:nvPr>
         </p:nvSpPr>
         <p:spPr>
+          <a:xfrm>
+            <a:off x="952500" y="2590800"/>
+            <a:ext cx="11099800" cy="6286500"/>
+          </a:xfrm>
           <a:prstGeom prst="rect">
             <a:avLst/>
           </a:prstGeom>
@@ -2660,7 +2649,7 @@
           <a:bodyPr/>
           <a:lstStyle/>
           <a:p>
-            <a:pPr lvl="0" marL="431165" indent="-431165" defTabSz="566674">
+            <a:pPr lvl="0" marL="862330" indent="-862330" defTabSz="566673">
               <a:spcBef>
                 <a:spcPts val="4000"/>
               </a:spcBef>
@@ -2675,21 +2664,21 @@
               </a:defRPr>
             </a:pPr>
             <a:r>
-              <a:rPr b="1" sz="3686">
-                <a:solidFill>
-                  <a:srgbClr val="FFFFFF"/>
-                </a:solidFill>
-              </a:rPr>
-              <a:t>Deriving knowledge and new conclusions by utilising the existing and open data is one of the greatest challenges in the last years both for governments, scientists and businesses</a:t>
-            </a:r>
-            <a:endParaRPr b="1" sz="3686">
+              <a:rPr sz="3600">
+                <a:solidFill>
+                  <a:srgbClr val="FFFFFF"/>
+                </a:solidFill>
+              </a:rPr>
+              <a:t>NASA has released a huge amount of data on data.nasa.gov, but it is poorly tagged with keywords (if at all)</a:t>
+            </a:r>
+            <a:endParaRPr sz="3600">
               <a:solidFill>
                 <a:srgbClr val="FFFFFF"/>
               </a:solidFill>
             </a:endParaRPr>
           </a:p>
           <a:p>
-            <a:pPr lvl="0" marL="431165" indent="-431165" defTabSz="566674">
+            <a:pPr lvl="0" marL="862330" indent="-862330" defTabSz="566673">
               <a:spcBef>
                 <a:spcPts val="4000"/>
               </a:spcBef>
@@ -2704,12 +2693,41 @@
               </a:defRPr>
             </a:pPr>
             <a:r>
-              <a:rPr b="1" sz="3686">
-                <a:solidFill>
-                  <a:srgbClr val="FFFFFF"/>
-                </a:solidFill>
-              </a:rPr>
-              <a:t>By building “intelligent” application that will use “CONSTELLATION KEY WORDS” meaning “Key words plus not so obvious but related tags placed by the data creators”, will lead to new and possibly much more meaningful results derived from the same data</a:t>
+              <a:rPr sz="3600">
+                <a:solidFill>
+                  <a:srgbClr val="FFFFFF"/>
+                </a:solidFill>
+              </a:rPr>
+              <a:t>Difficult to search, even harder to find connections between datasets</a:t>
+            </a:r>
+            <a:endParaRPr sz="3600">
+              <a:solidFill>
+                <a:srgbClr val="FFFFFF"/>
+              </a:solidFill>
+            </a:endParaRPr>
+          </a:p>
+          <a:p>
+            <a:pPr lvl="0" marL="862330" indent="-862330" defTabSz="566673">
+              <a:spcBef>
+                <a:spcPts val="4000"/>
+              </a:spcBef>
+              <a:buSzPct val="50000"/>
+              <a:buBlip>
+                <a:blip r:embed="rId2"/>
+              </a:buBlip>
+              <a:defRPr sz="1800">
+                <a:solidFill>
+                  <a:srgbClr val="000000"/>
+                </a:solidFill>
+              </a:defRPr>
+            </a:pPr>
+            <a:r>
+              <a:rPr sz="3600">
+                <a:solidFill>
+                  <a:srgbClr val="FFFFFF"/>
+                </a:solidFill>
+              </a:rPr>
+              <a:t>Other governmental agencies have also released open data, but there is no direct way to connect it with NASA’s data</a:t>
             </a:r>
           </a:p>
         </p:txBody>
@@ -2749,6 +2767,10 @@
           </p:nvPr>
         </p:nvSpPr>
         <p:spPr>
+          <a:xfrm>
+            <a:off x="952500" y="254000"/>
+            <a:ext cx="11099800" cy="2159000"/>
+          </a:xfrm>
           <a:prstGeom prst="rect">
             <a:avLst/>
           </a:prstGeom>
@@ -2782,7 +2804,7 @@
                   <a:srgbClr val="FFFB00"/>
                 </a:solidFill>
               </a:rPr>
-              <a:t>Creativity</a:t>
+              <a:t>Solution</a:t>
             </a:r>
           </a:p>
         </p:txBody>
@@ -2796,7 +2818,7 @@
         <p:spPr>
           <a:xfrm>
             <a:off x="8913151" y="9215966"/>
-            <a:ext cx="5865416" cy="554899"/>
+            <a:ext cx="5865417" cy="554900"/>
           </a:xfrm>
           <a:prstGeom prst="rect">
             <a:avLst/>
@@ -2855,6 +2877,10 @@
           </p:nvPr>
         </p:nvSpPr>
         <p:spPr>
+          <a:xfrm>
+            <a:off x="952500" y="2590800"/>
+            <a:ext cx="11099800" cy="6286500"/>
+          </a:xfrm>
           <a:prstGeom prst="rect">
             <a:avLst/>
           </a:prstGeom>
@@ -2863,7 +2889,10 @@
           <a:bodyPr/>
           <a:lstStyle/>
           <a:p>
-            <a:pPr lvl="0">
+            <a:pPr lvl="0" marL="862330" indent="-862330" defTabSz="566673">
+              <a:spcBef>
+                <a:spcPts val="4000"/>
+              </a:spcBef>
               <a:buSzPct val="50000"/>
               <a:buBlip>
                 <a:blip r:embed="rId2"/>
@@ -2875,29 +2904,115 @@
               </a:defRPr>
             </a:pPr>
             <a:r>
-              <a:rPr b="1" sz="3800">
-                <a:solidFill>
-                  <a:srgbClr val="FFFFFF"/>
-                </a:solidFill>
-              </a:rPr>
-              <a:t>Creative visualisation of the data from </a:t>
-            </a:r>
-            <a:r>
-              <a:rPr sz="3800" u="sng">
-                <a:solidFill>
-                  <a:srgbClr val="FFFFFF"/>
-                </a:solidFill>
-                <a:hlinkClick r:id="rId3" invalidUrl="" action="" tgtFrame="" tooltip="" history="1" highlightClick="0" endSnd="0"/>
-              </a:rPr>
-              <a:t>www.data.nasa.gov</a:t>
-            </a:r>
-            <a:r>
-              <a:rPr b="1" sz="3800">
-                <a:solidFill>
-                  <a:srgbClr val="FFFFFF"/>
-                </a:solidFill>
-              </a:rPr>
-              <a:t> in shape of the constellations in space which will illustrate the relations between key words and related tags from same area of interest i.e. from same constellation</a:t>
+              <a:rPr sz="3600">
+                <a:solidFill>
+                  <a:srgbClr val="FFFFFF"/>
+                </a:solidFill>
+              </a:rPr>
+              <a:t>Metadata for </a:t>
+            </a:r>
+            <a:r>
+              <a:rPr b="1" sz="3600">
+                <a:solidFill>
+                  <a:srgbClr val="FFFFFF"/>
+                </a:solidFill>
+              </a:rPr>
+              <a:t>~70</a:t>
+            </a:r>
+            <a:r>
+              <a:rPr sz="3600">
+                <a:solidFill>
+                  <a:srgbClr val="FFFFFF"/>
+                </a:solidFill>
+              </a:rPr>
+              <a:t> datasets provided in challenge starter kit</a:t>
+            </a:r>
+            <a:endParaRPr sz="3600">
+              <a:solidFill>
+                <a:srgbClr val="FFFFFF"/>
+              </a:solidFill>
+            </a:endParaRPr>
+          </a:p>
+          <a:p>
+            <a:pPr lvl="0" marL="862330" indent="-862330" defTabSz="566673">
+              <a:spcBef>
+                <a:spcPts val="4000"/>
+              </a:spcBef>
+              <a:buSzPct val="50000"/>
+              <a:buBlip>
+                <a:blip r:embed="rId2"/>
+              </a:buBlip>
+              <a:defRPr sz="1800">
+                <a:solidFill>
+                  <a:srgbClr val="000000"/>
+                </a:solidFill>
+              </a:defRPr>
+            </a:pPr>
+            <a:r>
+              <a:rPr sz="3600">
+                <a:solidFill>
+                  <a:srgbClr val="FFFFFF"/>
+                </a:solidFill>
+              </a:rPr>
+              <a:t>Pulled complete metadata from data.nasa.gov/data.json, plus data.json from other gov’t agencies</a:t>
+            </a:r>
+            <a:endParaRPr sz="3600">
+              <a:solidFill>
+                <a:srgbClr val="FFFFFF"/>
+              </a:solidFill>
+            </a:endParaRPr>
+          </a:p>
+          <a:p>
+            <a:pPr lvl="0" marL="862330" indent="-862330" defTabSz="566673">
+              <a:spcBef>
+                <a:spcPts val="4000"/>
+              </a:spcBef>
+              <a:buSzPct val="50000"/>
+              <a:buBlip>
+                <a:blip r:embed="rId2"/>
+              </a:buBlip>
+              <a:defRPr sz="1800">
+                <a:solidFill>
+                  <a:srgbClr val="000000"/>
+                </a:solidFill>
+              </a:defRPr>
+            </a:pPr>
+            <a:r>
+              <a:rPr sz="3600">
+                <a:solidFill>
+                  <a:srgbClr val="FFFFFF"/>
+                </a:solidFill>
+              </a:rPr>
+              <a:t>Derived new and meaningful keywords for all datasets</a:t>
+            </a:r>
+            <a:endParaRPr sz="3600">
+              <a:solidFill>
+                <a:srgbClr val="FFFFFF"/>
+              </a:solidFill>
+            </a:endParaRPr>
+          </a:p>
+          <a:p>
+            <a:pPr lvl="0" marL="862330" indent="-862330" defTabSz="566673">
+              <a:spcBef>
+                <a:spcPts val="4000"/>
+              </a:spcBef>
+              <a:buSzPct val="50000"/>
+              <a:buBlip>
+                <a:blip r:embed="rId2"/>
+              </a:buBlip>
+              <a:defRPr sz="1800">
+                <a:solidFill>
+                  <a:srgbClr val="000000"/>
+                </a:solidFill>
+              </a:defRPr>
+            </a:pPr>
+            <a:r>
+              <a:rPr sz="3600">
+                <a:solidFill>
+                  <a:srgbClr val="FFFFFF"/>
+                </a:solidFill>
+              </a:rPr>
+              <a:t>Interactive visualization of keywords and datasets</a:t>
             </a:r>
           </a:p>
         </p:txBody>
@@ -2937,6 +3052,10 @@
           </p:nvPr>
         </p:nvSpPr>
         <p:spPr>
+          <a:xfrm>
+            <a:off x="952500" y="254000"/>
+            <a:ext cx="11099800" cy="2159000"/>
+          </a:xfrm>
           <a:prstGeom prst="rect">
             <a:avLst/>
           </a:prstGeom>
@@ -2970,7 +3089,7 @@
                   <a:srgbClr val="FFFB00"/>
                 </a:solidFill>
               </a:rPr>
-              <a:t>Product</a:t>
+              <a:t>The Result</a:t>
             </a:r>
           </a:p>
         </p:txBody>
@@ -2984,7 +3103,7 @@
         <p:spPr>
           <a:xfrm>
             <a:off x="8913151" y="9215966"/>
-            <a:ext cx="5865416" cy="554899"/>
+            <a:ext cx="5865417" cy="554900"/>
           </a:xfrm>
           <a:prstGeom prst="rect">
             <a:avLst/>
@@ -3043,6 +3162,10 @@
           </p:nvPr>
         </p:nvSpPr>
         <p:spPr>
+          <a:xfrm>
+            <a:off x="952500" y="2590800"/>
+            <a:ext cx="11099800" cy="6286500"/>
+          </a:xfrm>
           <a:prstGeom prst="rect">
             <a:avLst/>
           </a:prstGeom>
@@ -3051,7 +3174,10 @@
           <a:bodyPr/>
           <a:lstStyle/>
           <a:p>
-            <a:pPr lvl="0">
+            <a:pPr lvl="0" marL="853706" indent="-853706" defTabSz="561007">
+              <a:spcBef>
+                <a:spcPts val="3900"/>
+              </a:spcBef>
               <a:buSzPct val="50000"/>
               <a:buBlip>
                 <a:blip r:embed="rId2"/>
@@ -3063,21 +3189,56 @@
               </a:defRPr>
             </a:pPr>
             <a:r>
-              <a:rPr b="1" sz="3800">
-                <a:solidFill>
-                  <a:srgbClr val="FFFFFF"/>
-                </a:solidFill>
-              </a:rPr>
-              <a:t>Completely finished product</a:t>
-            </a:r>
-            <a:endParaRPr b="1" sz="3800">
+              <a:rPr sz="3564">
+                <a:solidFill>
+                  <a:srgbClr val="FFFFFF"/>
+                </a:solidFill>
+              </a:rPr>
+              <a:t>Keywords tagged for </a:t>
+            </a:r>
+            <a:r>
+              <a:rPr b="1" sz="3564">
+                <a:solidFill>
+                  <a:srgbClr val="FFFFFF"/>
+                </a:solidFill>
+              </a:rPr>
+              <a:t>26000</a:t>
+            </a:r>
+            <a:r>
+              <a:rPr sz="3564">
+                <a:solidFill>
+                  <a:srgbClr val="FFFFFF"/>
+                </a:solidFill>
+              </a:rPr>
+              <a:t> datasets, including </a:t>
+            </a:r>
+            <a:r>
+              <a:rPr b="1" sz="3564">
+                <a:solidFill>
+                  <a:srgbClr val="FFFFFF"/>
+                </a:solidFill>
+              </a:rPr>
+              <a:t>16600</a:t>
+            </a:r>
+            <a:r>
+              <a:rPr sz="3564">
+                <a:solidFill>
+                  <a:srgbClr val="FFFFFF"/>
+                </a:solidFill>
+              </a:rPr>
+              <a:t> from NASA</a:t>
+            </a:r>
+            <a:endParaRPr sz="3564">
               <a:solidFill>
                 <a:srgbClr val="FFFFFF"/>
               </a:solidFill>
             </a:endParaRPr>
           </a:p>
           <a:p>
-            <a:pPr lvl="0">
+            <a:pPr lvl="1" marL="1293761" indent="-853706" defTabSz="561007">
+              <a:spcBef>
+                <a:spcPts val="3900"/>
+              </a:spcBef>
               <a:buSzPct val="50000"/>
               <a:buBlip>
                 <a:blip r:embed="rId2"/>
@@ -3089,12 +3250,163 @@
               </a:defRPr>
             </a:pPr>
             <a:r>
-              <a:rPr b="1" sz="3800">
-                <a:solidFill>
-                  <a:srgbClr val="FFFFFF"/>
-                </a:solidFill>
-              </a:rPr>
-              <a:t>UI/UX improvements are possible</a:t>
+              <a:rPr b="1" sz="3564">
+                <a:solidFill>
+                  <a:srgbClr val="FFFFFF"/>
+                </a:solidFill>
+              </a:rPr>
+              <a:t>188812</a:t>
+            </a:r>
+            <a:r>
+              <a:rPr sz="3564">
+                <a:solidFill>
+                  <a:srgbClr val="FFFFFF"/>
+                </a:solidFill>
+              </a:rPr>
+              <a:t> keywords tagged</a:t>
+            </a:r>
+            <a:endParaRPr sz="3564">
+              <a:solidFill>
+                <a:srgbClr val="FFFFFF"/>
+              </a:solidFill>
+            </a:endParaRPr>
+          </a:p>
+          <a:p>
+            <a:pPr lvl="1" marL="1293761" indent="-853706" defTabSz="561007">
+              <a:spcBef>
+                <a:spcPts val="3900"/>
+              </a:spcBef>
+              <a:buSzPct val="50000"/>
+              <a:buBlip>
+                <a:blip r:embed="rId2"/>
+              </a:buBlip>
+              <a:defRPr sz="1800">
+                <a:solidFill>
+                  <a:srgbClr val="000000"/>
+                </a:solidFill>
+              </a:defRPr>
+            </a:pPr>
+            <a:r>
+              <a:rPr b="1" sz="3564">
+                <a:solidFill>
+                  <a:srgbClr val="FFFFFF"/>
+                </a:solidFill>
+              </a:rPr>
+              <a:t>12152</a:t>
+            </a:r>
+            <a:r>
+              <a:rPr sz="3564">
+                <a:solidFill>
+                  <a:srgbClr val="FFFFFF"/>
+                </a:solidFill>
+              </a:rPr>
+              <a:t> unique keywords</a:t>
+            </a:r>
+            <a:endParaRPr b="1" sz="3564">
+              <a:solidFill>
+                <a:srgbClr val="FFFFFF"/>
+              </a:solidFill>
+            </a:endParaRPr>
+          </a:p>
+          <a:p>
+            <a:pPr lvl="0" marL="853706" indent="-853706" defTabSz="561007">
+              <a:spcBef>
+                <a:spcPts val="3900"/>
+              </a:spcBef>
+              <a:buSzPct val="50000"/>
+              <a:buBlip>
+                <a:blip r:embed="rId2"/>
+              </a:buBlip>
+              <a:defRPr sz="1800">
+                <a:solidFill>
+                  <a:srgbClr val="000000"/>
+                </a:solidFill>
+              </a:defRPr>
+            </a:pPr>
+            <a:r>
+              <a:rPr sz="3564">
+                <a:solidFill>
+                  <a:srgbClr val="FFFFFF"/>
+                </a:solidFill>
+              </a:rPr>
+              <a:t>Tagged keywords for data from </a:t>
+            </a:r>
+            <a:r>
+              <a:rPr b="1" sz="3564">
+                <a:solidFill>
+                  <a:srgbClr val="FFFFFF"/>
+                </a:solidFill>
+              </a:rPr>
+              <a:t>7</a:t>
+            </a:r>
+            <a:r>
+              <a:rPr sz="3564">
+                <a:solidFill>
+                  <a:srgbClr val="FFFFFF"/>
+                </a:solidFill>
+              </a:rPr>
+              <a:t> other agencies and </a:t>
+            </a:r>
+            <a:r>
+              <a:rPr b="1" sz="3564">
+                <a:solidFill>
+                  <a:srgbClr val="FFFFFF"/>
+                </a:solidFill>
+              </a:rPr>
+              <a:t>12 </a:t>
+            </a:r>
+            <a:r>
+              <a:rPr sz="3564">
+                <a:solidFill>
+                  <a:srgbClr val="FFFFFF"/>
+                </a:solidFill>
+              </a:rPr>
+              <a:t>states</a:t>
+            </a:r>
+            <a:endParaRPr sz="3564">
+              <a:solidFill>
+                <a:srgbClr val="FFFFFF"/>
+              </a:solidFill>
+            </a:endParaRPr>
+          </a:p>
+          <a:p>
+            <a:pPr lvl="0" marL="853706" indent="-853706" defTabSz="561007">
+              <a:spcBef>
+                <a:spcPts val="3900"/>
+              </a:spcBef>
+              <a:buSzPct val="50000"/>
+              <a:buBlip>
+                <a:blip r:embed="rId2"/>
+              </a:buBlip>
+              <a:defRPr sz="1800">
+                <a:solidFill>
+                  <a:srgbClr val="000000"/>
+                </a:solidFill>
+              </a:defRPr>
+            </a:pPr>
+            <a:r>
+              <a:rPr sz="3564">
+                <a:solidFill>
+                  <a:srgbClr val="FFFFFF"/>
+                </a:solidFill>
+              </a:rPr>
+              <a:t>Connected </a:t>
+            </a:r>
+            <a:r>
+              <a:rPr b="1" sz="3564">
+                <a:solidFill>
+                  <a:srgbClr val="FFFFFF"/>
+                </a:solidFill>
+              </a:rPr>
+              <a:t>3000</a:t>
+            </a:r>
+            <a:r>
+              <a:rPr sz="3564">
+                <a:solidFill>
+                  <a:srgbClr val="FFFFFF"/>
+                </a:solidFill>
+              </a:rPr>
+              <a:t> NASA datasets to other open data via new keywords </a:t>
             </a:r>
           </a:p>
         </p:txBody>
@@ -3134,6 +3446,10 @@
           </p:nvPr>
         </p:nvSpPr>
         <p:spPr>
+          <a:xfrm>
+            <a:off x="952500" y="254000"/>
+            <a:ext cx="11099800" cy="2159000"/>
+          </a:xfrm>
           <a:prstGeom prst="rect">
             <a:avLst/>
           </a:prstGeom>
@@ -3167,7 +3483,7 @@
                   <a:srgbClr val="FFFB00"/>
                 </a:solidFill>
               </a:rPr>
-              <a:t>Sustainability</a:t>
+              <a:t>Before/after</a:t>
             </a:r>
           </a:p>
         </p:txBody>
@@ -3176,129 +3492,12 @@
         <p:nvSpPr>
           <p:cNvPr id="49" name="Shape 49"/>
           <p:cNvSpPr/>
-          <p:nvPr>
-            <p:ph type="body" idx="1"/>
-          </p:nvPr>
-        </p:nvSpPr>
-        <p:spPr>
-          <a:prstGeom prst="rect">
-            <a:avLst/>
-          </a:prstGeom>
-        </p:spPr>
-        <p:txBody>
-          <a:bodyPr/>
-          <a:lstStyle/>
-          <a:p>
-            <a:pPr lvl="0">
-              <a:buSzPct val="50000"/>
-              <a:buBlip>
-                <a:blip r:embed="rId2"/>
-              </a:buBlip>
-              <a:defRPr sz="1800">
-                <a:solidFill>
-                  <a:srgbClr val="000000"/>
-                </a:solidFill>
-              </a:defRPr>
-            </a:pPr>
-            <a:r>
-              <a:rPr b="1" sz="3800">
-                <a:solidFill>
-                  <a:srgbClr val="FFFFFF"/>
-                </a:solidFill>
-              </a:rPr>
-              <a:t>Open Source Application</a:t>
-            </a:r>
-            <a:endParaRPr b="1" sz="3800">
-              <a:solidFill>
-                <a:srgbClr val="FFFFFF"/>
-              </a:solidFill>
-            </a:endParaRPr>
-          </a:p>
-          <a:p>
-            <a:pPr lvl="0">
-              <a:buSzPct val="50000"/>
-              <a:buBlip>
-                <a:blip r:embed="rId2"/>
-              </a:buBlip>
-              <a:defRPr sz="1800">
-                <a:solidFill>
-                  <a:srgbClr val="000000"/>
-                </a:solidFill>
-              </a:defRPr>
-            </a:pPr>
-            <a:r>
-              <a:rPr b="1" sz="3800">
-                <a:solidFill>
-                  <a:srgbClr val="FFFFFF"/>
-                </a:solidFill>
-              </a:rPr>
-              <a:t>Free for usage</a:t>
-            </a:r>
-            <a:endParaRPr b="1" sz="3800">
-              <a:solidFill>
-                <a:srgbClr val="FFFFFF"/>
-              </a:solidFill>
-            </a:endParaRPr>
-          </a:p>
-          <a:p>
-            <a:pPr lvl="0">
-              <a:buSzPct val="50000"/>
-              <a:buBlip>
-                <a:blip r:embed="rId2"/>
-              </a:buBlip>
-              <a:defRPr sz="1800">
-                <a:solidFill>
-                  <a:srgbClr val="000000"/>
-                </a:solidFill>
-              </a:defRPr>
-            </a:pPr>
-            <a:r>
-              <a:rPr b="1" sz="3800">
-                <a:solidFill>
-                  <a:srgbClr val="FFFFFF"/>
-                </a:solidFill>
-              </a:rPr>
-              <a:t>Instant automated updates</a:t>
-            </a:r>
-            <a:endParaRPr b="1" sz="3800">
-              <a:solidFill>
-                <a:srgbClr val="FFFFFF"/>
-              </a:solidFill>
-            </a:endParaRPr>
-          </a:p>
-          <a:p>
-            <a:pPr lvl="0">
-              <a:buSzPct val="50000"/>
-              <a:buBlip>
-                <a:blip r:embed="rId2"/>
-              </a:buBlip>
-              <a:defRPr sz="1800">
-                <a:solidFill>
-                  <a:srgbClr val="000000"/>
-                </a:solidFill>
-              </a:defRPr>
-            </a:pPr>
-            <a:r>
-              <a:rPr b="1" sz="3800">
-                <a:solidFill>
-                  <a:srgbClr val="FFFFFF"/>
-                </a:solidFill>
-              </a:rPr>
-              <a:t>Donations will be accepted</a:t>
-            </a:r>
-          </a:p>
-        </p:txBody>
-      </p:sp>
-      <p:sp>
-        <p:nvSpPr>
-          <p:cNvPr id="50" name="Shape 50"/>
-          <p:cNvSpPr/>
           <p:nvPr/>
         </p:nvSpPr>
         <p:spPr>
           <a:xfrm>
             <a:off x="8913151" y="9215966"/>
-            <a:ext cx="5865416" cy="554899"/>
+            <a:ext cx="5865417" cy="554900"/>
           </a:xfrm>
           <a:prstGeom prst="rect">
             <a:avLst/>
@@ -3348,6 +3547,1158 @@
           </a:p>
         </p:txBody>
       </p:sp>
+      <p:sp>
+        <p:nvSpPr>
+          <p:cNvPr id="50" name="Shape 50"/>
+          <p:cNvSpPr/>
+          <p:nvPr>
+            <p:ph type="body" idx="1"/>
+          </p:nvPr>
+        </p:nvSpPr>
+        <p:spPr>
+          <a:xfrm>
+            <a:off x="952500" y="2590800"/>
+            <a:ext cx="11099800" cy="6286500"/>
+          </a:xfrm>
+          <a:prstGeom prst="rect">
+            <a:avLst/>
+          </a:prstGeom>
+        </p:spPr>
+        <p:txBody>
+          <a:bodyPr/>
+          <a:lstStyle/>
+          <a:p>
+            <a:pPr lvl="0" marL="776097" indent="-776097" defTabSz="510006">
+              <a:spcBef>
+                <a:spcPts val="3600"/>
+              </a:spcBef>
+              <a:buSzPct val="50000"/>
+              <a:buBlip>
+                <a:blip r:embed="rId2"/>
+              </a:buBlip>
+              <a:defRPr sz="1800">
+                <a:solidFill>
+                  <a:srgbClr val="000000"/>
+                </a:solidFill>
+              </a:defRPr>
+            </a:pPr>
+            <a:r>
+              <a:rPr sz="3239" u="sng">
+                <a:solidFill>
+                  <a:srgbClr val="FFFFFF"/>
+                </a:solidFill>
+              </a:rPr>
+              <a:t>Before</a:t>
+            </a:r>
+            <a:endParaRPr sz="3239" u="sng">
+              <a:solidFill>
+                <a:srgbClr val="FFFFFF"/>
+              </a:solidFill>
+            </a:endParaRPr>
+          </a:p>
+          <a:p>
+            <a:pPr lvl="1" marL="1176147" indent="-776097" defTabSz="510006">
+              <a:spcBef>
+                <a:spcPts val="3600"/>
+              </a:spcBef>
+              <a:buSzPct val="50000"/>
+              <a:buBlip>
+                <a:blip r:embed="rId2"/>
+              </a:buBlip>
+              <a:defRPr sz="1800">
+                <a:solidFill>
+                  <a:srgbClr val="000000"/>
+                </a:solidFill>
+              </a:defRPr>
+            </a:pPr>
+            <a:r>
+              <a:rPr sz="3239">
+                <a:solidFill>
+                  <a:srgbClr val="FFFFFF"/>
+                </a:solidFill>
+              </a:rPr>
+              <a:t>Most common keywords: </a:t>
+            </a:r>
+            <a:r>
+              <a:rPr b="1" sz="3239">
+                <a:solidFill>
+                  <a:srgbClr val="FFFFFF"/>
+                </a:solidFill>
+              </a:rPr>
+              <a:t>“Project”</a:t>
+            </a:r>
+            <a:r>
+              <a:rPr sz="3239">
+                <a:solidFill>
+                  <a:srgbClr val="FFFFFF"/>
+                </a:solidFill>
+              </a:rPr>
+              <a:t>, </a:t>
+            </a:r>
+            <a:r>
+              <a:rPr b="1" sz="3239">
+                <a:solidFill>
+                  <a:srgbClr val="FFFFFF"/>
+                </a:solidFill>
+              </a:rPr>
+              <a:t>“Complete”</a:t>
+            </a:r>
+            <a:endParaRPr b="1" sz="3239">
+              <a:solidFill>
+                <a:srgbClr val="FFFFFF"/>
+              </a:solidFill>
+            </a:endParaRPr>
+          </a:p>
+          <a:p>
+            <a:pPr lvl="1" marL="1176147" indent="-776097" defTabSz="510006">
+              <a:spcBef>
+                <a:spcPts val="3600"/>
+              </a:spcBef>
+              <a:buSzPct val="50000"/>
+              <a:buBlip>
+                <a:blip r:embed="rId2"/>
+              </a:buBlip>
+              <a:defRPr sz="1800">
+                <a:solidFill>
+                  <a:srgbClr val="000000"/>
+                </a:solidFill>
+              </a:defRPr>
+            </a:pPr>
+            <a:r>
+              <a:rPr sz="3239">
+                <a:solidFill>
+                  <a:srgbClr val="FFFFFF"/>
+                </a:solidFill>
+              </a:rPr>
+              <a:t>NASA Datasets tagged with “space”: </a:t>
+            </a:r>
+            <a:r>
+              <a:rPr b="1" sz="3239">
+                <a:solidFill>
+                  <a:srgbClr val="FFFFFF"/>
+                </a:solidFill>
+              </a:rPr>
+              <a:t>1</a:t>
+            </a:r>
+            <a:endParaRPr b="1" sz="3239">
+              <a:solidFill>
+                <a:srgbClr val="FFFFFF"/>
+              </a:solidFill>
+            </a:endParaRPr>
+          </a:p>
+          <a:p>
+            <a:pPr lvl="1" marL="1176147" indent="-776097" defTabSz="510006">
+              <a:spcBef>
+                <a:spcPts val="3600"/>
+              </a:spcBef>
+              <a:buSzPct val="50000"/>
+              <a:buBlip>
+                <a:blip r:embed="rId2"/>
+              </a:buBlip>
+              <a:defRPr sz="1800">
+                <a:solidFill>
+                  <a:srgbClr val="000000"/>
+                </a:solidFill>
+              </a:defRPr>
+            </a:pPr>
+            <a:r>
+              <a:rPr sz="3239">
+                <a:solidFill>
+                  <a:srgbClr val="FFFFFF"/>
+                </a:solidFill>
+              </a:rPr>
+              <a:t>Non-NASA datasets tagged with “space”: </a:t>
+            </a:r>
+            <a:r>
+              <a:rPr b="1" sz="3239">
+                <a:solidFill>
+                  <a:srgbClr val="FFFFFF"/>
+                </a:solidFill>
+              </a:rPr>
+              <a:t>5</a:t>
+            </a:r>
+            <a:endParaRPr sz="3239">
+              <a:solidFill>
+                <a:srgbClr val="FFFFFF"/>
+              </a:solidFill>
+            </a:endParaRPr>
+          </a:p>
+          <a:p>
+            <a:pPr lvl="0" marL="776097" indent="-776097" defTabSz="510006">
+              <a:spcBef>
+                <a:spcPts val="3600"/>
+              </a:spcBef>
+              <a:buSzPct val="50000"/>
+              <a:buBlip>
+                <a:blip r:embed="rId2"/>
+              </a:buBlip>
+              <a:defRPr sz="1800">
+                <a:solidFill>
+                  <a:srgbClr val="000000"/>
+                </a:solidFill>
+              </a:defRPr>
+            </a:pPr>
+            <a:r>
+              <a:rPr sz="3239" u="sng">
+                <a:solidFill>
+                  <a:srgbClr val="FFFFFF"/>
+                </a:solidFill>
+              </a:rPr>
+              <a:t>After</a:t>
+            </a:r>
+            <a:endParaRPr sz="3239">
+              <a:solidFill>
+                <a:srgbClr val="FFFFFF"/>
+              </a:solidFill>
+            </a:endParaRPr>
+          </a:p>
+          <a:p>
+            <a:pPr lvl="1" marL="1176147" indent="-776097" defTabSz="510006">
+              <a:spcBef>
+                <a:spcPts val="3600"/>
+              </a:spcBef>
+              <a:buSzPct val="50000"/>
+              <a:buBlip>
+                <a:blip r:embed="rId2"/>
+              </a:buBlip>
+              <a:defRPr sz="1800">
+                <a:solidFill>
+                  <a:srgbClr val="000000"/>
+                </a:solidFill>
+              </a:defRPr>
+            </a:pPr>
+            <a:r>
+              <a:rPr sz="3239">
+                <a:solidFill>
+                  <a:srgbClr val="FFFFFF"/>
+                </a:solidFill>
+              </a:rPr>
+              <a:t>Most common keywords: </a:t>
+            </a:r>
+            <a:r>
+              <a:rPr b="1" sz="3239">
+                <a:solidFill>
+                  <a:srgbClr val="FFFFFF"/>
+                </a:solidFill>
+              </a:rPr>
+              <a:t>“Phase I”</a:t>
+            </a:r>
+            <a:r>
+              <a:rPr sz="3239">
+                <a:solidFill>
+                  <a:srgbClr val="FFFFFF"/>
+                </a:solidFill>
+              </a:rPr>
+              <a:t>, </a:t>
+            </a:r>
+            <a:r>
+              <a:rPr b="1" sz="3239">
+                <a:solidFill>
+                  <a:srgbClr val="FFFFFF"/>
+                </a:solidFill>
+              </a:rPr>
+              <a:t>“Phase II”</a:t>
+            </a:r>
+            <a:r>
+              <a:rPr sz="3239">
+                <a:solidFill>
+                  <a:srgbClr val="FFFFFF"/>
+                </a:solidFill>
+              </a:rPr>
+              <a:t>, </a:t>
+            </a:r>
+            <a:r>
+              <a:rPr b="1" sz="3239">
+                <a:solidFill>
+                  <a:srgbClr val="FFFFFF"/>
+                </a:solidFill>
+              </a:rPr>
+              <a:t>“NASA”</a:t>
+            </a:r>
+            <a:r>
+              <a:rPr sz="3239">
+                <a:solidFill>
+                  <a:srgbClr val="FFFFFF"/>
+                </a:solidFill>
+              </a:rPr>
+              <a:t>, </a:t>
+            </a:r>
+            <a:r>
+              <a:rPr b="1" sz="3239">
+                <a:solidFill>
+                  <a:srgbClr val="FFFFFF"/>
+                </a:solidFill>
+              </a:rPr>
+              <a:t>“International Earth Science Information Network”</a:t>
+            </a:r>
+          </a:p>
+        </p:txBody>
+      </p:sp>
+    </p:spTree>
+  </p:cSld>
+  <p:clrMapOvr>
+    <a:masterClrMapping/>
+  </p:clrMapOvr>
+  <p:transition spd="med" advClick="1"/>
+</p:sld>
+</file>
+
+<file path=ppt/slides/slide6.xml><?xml version="1.0" encoding="utf-8"?>
+<p:sld xmlns:a="http://schemas.openxmlformats.org/drawingml/2006/main" xmlns:r="http://schemas.openxmlformats.org/officeDocument/2006/relationships" xmlns:p="http://schemas.openxmlformats.org/presentationml/2006/main" showMasterSp="1" showMasterPhAnim="1">
+  <p:cSld>
+    <p:spTree>
+      <p:nvGrpSpPr>
+        <p:cNvPr id="1" name=""/>
+        <p:cNvGrpSpPr/>
+        <p:nvPr/>
+      </p:nvGrpSpPr>
+      <p:grpSpPr>
+        <a:xfrm>
+          <a:off x="0" y="0"/>
+          <a:ext cx="0" cy="0"/>
+          <a:chOff x="0" y="0"/>
+          <a:chExt cx="0" cy="0"/>
+        </a:xfrm>
+      </p:grpSpPr>
+      <p:sp>
+        <p:nvSpPr>
+          <p:cNvPr id="52" name="Shape 52"/>
+          <p:cNvSpPr/>
+          <p:nvPr>
+            <p:ph type="title"/>
+          </p:nvPr>
+        </p:nvSpPr>
+        <p:spPr>
+          <a:xfrm>
+            <a:off x="952500" y="254000"/>
+            <a:ext cx="11099800" cy="2159000"/>
+          </a:xfrm>
+          <a:prstGeom prst="rect">
+            <a:avLst/>
+          </a:prstGeom>
+        </p:spPr>
+        <p:txBody>
+          <a:bodyPr/>
+          <a:lstStyle>
+            <a:lvl1pPr>
+              <a:defRPr sz="10000">
+                <a:solidFill>
+                  <a:srgbClr val="FFFB00"/>
+                </a:solidFill>
+                <a:latin typeface="Lithos Pro Black"/>
+                <a:ea typeface="Lithos Pro Black"/>
+                <a:cs typeface="Lithos Pro Black"/>
+                <a:sym typeface="Lithos Pro Black"/>
+              </a:defRPr>
+            </a:lvl1pPr>
+          </a:lstStyle>
+          <a:p>
+            <a:pPr lvl="0">
+              <a:defRPr sz="1800">
+                <a:solidFill>
+                  <a:srgbClr val="000000"/>
+                </a:solidFill>
+              </a:defRPr>
+            </a:pPr>
+            <a:r>
+              <a:rPr sz="10000">
+                <a:solidFill>
+                  <a:srgbClr val="FFFB00"/>
+                </a:solidFill>
+              </a:rPr>
+              <a:t>Impact</a:t>
+            </a:r>
+          </a:p>
+        </p:txBody>
+      </p:sp>
+      <p:sp>
+        <p:nvSpPr>
+          <p:cNvPr id="53" name="Shape 53"/>
+          <p:cNvSpPr/>
+          <p:nvPr/>
+        </p:nvSpPr>
+        <p:spPr>
+          <a:xfrm>
+            <a:off x="8913151" y="9215966"/>
+            <a:ext cx="5865417" cy="554900"/>
+          </a:xfrm>
+          <a:prstGeom prst="rect">
+            <a:avLst/>
+          </a:prstGeom>
+          <a:ln w="12700">
+            <a:miter lim="400000"/>
+          </a:ln>
+          <a:extLst>
+            <a:ext uri="{C572A759-6A51-4108-AA02-DFA0A04FC94B}">
+              <ma14:wrappingTextBoxFlag xmlns:ma14="http://schemas.microsoft.com/office/mac/drawingml/2011/main" val="1"/>
+            </a:ext>
+          </a:extLst>
+        </p:spPr>
+        <p:txBody>
+          <a:bodyPr lIns="0" tIns="0" rIns="0" bIns="0" anchor="b">
+            <a:normAutofit fontScale="100000" lnSpcReduction="0"/>
+          </a:bodyPr>
+          <a:lstStyle>
+            <a:lvl1pPr>
+              <a:defRPr sz="3000">
+                <a:solidFill>
+                  <a:srgbClr val="FFFB00"/>
+                </a:solidFill>
+                <a:latin typeface="Lithos Pro Black"/>
+                <a:ea typeface="Lithos Pro Black"/>
+                <a:cs typeface="Lithos Pro Black"/>
+                <a:sym typeface="Lithos Pro Black"/>
+              </a:defRPr>
+            </a:lvl1pPr>
+          </a:lstStyle>
+          <a:p>
+            <a:pPr lvl="0">
+              <a:defRPr sz="1800">
+                <a:solidFill>
+                  <a:srgbClr val="000000"/>
+                </a:solidFill>
+              </a:defRPr>
+            </a:pPr>
+            <a:r>
+              <a:rPr sz="3000">
+                <a:solidFill>
+                  <a:srgbClr val="FFFB00"/>
+                </a:solidFill>
+              </a:rPr>
+              <a:t>SpaceTag</a:t>
+            </a:r>
+          </a:p>
+        </p:txBody>
+      </p:sp>
+      <p:sp>
+        <p:nvSpPr>
+          <p:cNvPr id="54" name="Shape 54"/>
+          <p:cNvSpPr/>
+          <p:nvPr>
+            <p:ph type="body" idx="1"/>
+          </p:nvPr>
+        </p:nvSpPr>
+        <p:spPr>
+          <a:xfrm>
+            <a:off x="952500" y="2590800"/>
+            <a:ext cx="11099800" cy="6286500"/>
+          </a:xfrm>
+          <a:prstGeom prst="rect">
+            <a:avLst/>
+          </a:prstGeom>
+        </p:spPr>
+        <p:txBody>
+          <a:bodyPr/>
+          <a:lstStyle/>
+          <a:p>
+            <a:pPr lvl="0" marL="801966" indent="-801966" defTabSz="527006">
+              <a:spcBef>
+                <a:spcPts val="3700"/>
+              </a:spcBef>
+              <a:buSzPct val="50000"/>
+              <a:buBlip>
+                <a:blip r:embed="rId2"/>
+              </a:buBlip>
+              <a:defRPr sz="1800">
+                <a:solidFill>
+                  <a:srgbClr val="000000"/>
+                </a:solidFill>
+              </a:defRPr>
+            </a:pPr>
+            <a:r>
+              <a:rPr sz="3348">
+                <a:solidFill>
+                  <a:srgbClr val="FFFFFF"/>
+                </a:solidFill>
+              </a:rPr>
+              <a:t>Deriving knowledge and new conclusions by utilizing existing and open data is one of the greatest challenges in recent years for government, science and business</a:t>
+            </a:r>
+            <a:endParaRPr sz="3348"/>
+          </a:p>
+          <a:p>
+            <a:pPr lvl="0" marL="801966" indent="-801966" defTabSz="527006">
+              <a:spcBef>
+                <a:spcPts val="3700"/>
+              </a:spcBef>
+              <a:buSzPct val="50000"/>
+              <a:buBlip>
+                <a:blip r:embed="rId2"/>
+              </a:buBlip>
+              <a:defRPr sz="1800">
+                <a:solidFill>
+                  <a:srgbClr val="000000"/>
+                </a:solidFill>
+              </a:defRPr>
+            </a:pPr>
+            <a:r>
+              <a:rPr sz="3348">
+                <a:solidFill>
+                  <a:srgbClr val="FFFFFF"/>
+                </a:solidFill>
+              </a:rPr>
+              <a:t>Building an intelligent and automated application to derive keywords for open data will ensure that datasets are searchable and connected both within and across agencies</a:t>
+            </a:r>
+            <a:endParaRPr sz="3348">
+              <a:solidFill>
+                <a:srgbClr val="FFFFFF"/>
+              </a:solidFill>
+            </a:endParaRPr>
+          </a:p>
+          <a:p>
+            <a:pPr lvl="0" marL="801966" indent="-801966" defTabSz="527006">
+              <a:spcBef>
+                <a:spcPts val="3700"/>
+              </a:spcBef>
+              <a:buSzPct val="50000"/>
+              <a:buBlip>
+                <a:blip r:embed="rId2"/>
+              </a:buBlip>
+              <a:defRPr sz="1800">
+                <a:solidFill>
+                  <a:srgbClr val="000000"/>
+                </a:solidFill>
+              </a:defRPr>
+            </a:pPr>
+            <a:r>
+              <a:rPr sz="3348">
+                <a:solidFill>
+                  <a:srgbClr val="FFFFFF"/>
+                </a:solidFill>
+              </a:rPr>
+              <a:t>The interactive visualization of “constellations” of keywords will lead to new and possibly much more meaningful results derived from the same data</a:t>
+            </a:r>
+          </a:p>
+        </p:txBody>
+      </p:sp>
+    </p:spTree>
+  </p:cSld>
+  <p:clrMapOvr>
+    <a:masterClrMapping/>
+  </p:clrMapOvr>
+  <p:transition spd="med" advClick="1"/>
+</p:sld>
+</file>
+
+<file path=ppt/slides/slide7.xml><?xml version="1.0" encoding="utf-8"?>
+<p:sld xmlns:a="http://schemas.openxmlformats.org/drawingml/2006/main" xmlns:r="http://schemas.openxmlformats.org/officeDocument/2006/relationships" xmlns:p="http://schemas.openxmlformats.org/presentationml/2006/main" showMasterSp="1" showMasterPhAnim="1">
+  <p:cSld>
+    <p:spTree>
+      <p:nvGrpSpPr>
+        <p:cNvPr id="1" name=""/>
+        <p:cNvGrpSpPr/>
+        <p:nvPr/>
+      </p:nvGrpSpPr>
+      <p:grpSpPr>
+        <a:xfrm>
+          <a:off x="0" y="0"/>
+          <a:ext cx="0" cy="0"/>
+          <a:chOff x="0" y="0"/>
+          <a:chExt cx="0" cy="0"/>
+        </a:xfrm>
+      </p:grpSpPr>
+      <p:sp>
+        <p:nvSpPr>
+          <p:cNvPr id="56" name="Shape 56"/>
+          <p:cNvSpPr/>
+          <p:nvPr>
+            <p:ph type="title"/>
+          </p:nvPr>
+        </p:nvSpPr>
+        <p:spPr>
+          <a:xfrm>
+            <a:off x="952500" y="254000"/>
+            <a:ext cx="11099800" cy="2159000"/>
+          </a:xfrm>
+          <a:prstGeom prst="rect">
+            <a:avLst/>
+          </a:prstGeom>
+        </p:spPr>
+        <p:txBody>
+          <a:bodyPr/>
+          <a:lstStyle>
+            <a:lvl1pPr>
+              <a:defRPr sz="10000">
+                <a:solidFill>
+                  <a:srgbClr val="FFFB00"/>
+                </a:solidFill>
+                <a:latin typeface="Lithos Pro Black"/>
+                <a:ea typeface="Lithos Pro Black"/>
+                <a:cs typeface="Lithos Pro Black"/>
+                <a:sym typeface="Lithos Pro Black"/>
+              </a:defRPr>
+            </a:lvl1pPr>
+          </a:lstStyle>
+          <a:p>
+            <a:pPr lvl="0">
+              <a:defRPr sz="1800">
+                <a:solidFill>
+                  <a:srgbClr val="000000"/>
+                </a:solidFill>
+              </a:defRPr>
+            </a:pPr>
+            <a:r>
+              <a:rPr sz="10000">
+                <a:solidFill>
+                  <a:srgbClr val="FFFB00"/>
+                </a:solidFill>
+              </a:rPr>
+              <a:t>Creativity</a:t>
+            </a:r>
+          </a:p>
+        </p:txBody>
+      </p:sp>
+      <p:sp>
+        <p:nvSpPr>
+          <p:cNvPr id="57" name="Shape 57"/>
+          <p:cNvSpPr/>
+          <p:nvPr/>
+        </p:nvSpPr>
+        <p:spPr>
+          <a:xfrm>
+            <a:off x="8913151" y="9215966"/>
+            <a:ext cx="5865417" cy="554900"/>
+          </a:xfrm>
+          <a:prstGeom prst="rect">
+            <a:avLst/>
+          </a:prstGeom>
+          <a:ln w="12700">
+            <a:miter lim="400000"/>
+          </a:ln>
+          <a:extLst>
+            <a:ext uri="{C572A759-6A51-4108-AA02-DFA0A04FC94B}">
+              <ma14:wrappingTextBoxFlag xmlns:ma14="http://schemas.microsoft.com/office/mac/drawingml/2011/main" val="1"/>
+            </a:ext>
+          </a:extLst>
+        </p:spPr>
+        <p:txBody>
+          <a:bodyPr lIns="0" tIns="0" rIns="0" bIns="0" anchor="b">
+            <a:normAutofit fontScale="100000" lnSpcReduction="0"/>
+          </a:bodyPr>
+          <a:lstStyle>
+            <a:lvl1pPr>
+              <a:defRPr sz="3000">
+                <a:solidFill>
+                  <a:srgbClr val="FFFB00"/>
+                </a:solidFill>
+                <a:latin typeface="Lithos Pro Black"/>
+                <a:ea typeface="Lithos Pro Black"/>
+                <a:cs typeface="Lithos Pro Black"/>
+                <a:sym typeface="Lithos Pro Black"/>
+              </a:defRPr>
+            </a:lvl1pPr>
+          </a:lstStyle>
+          <a:p>
+            <a:pPr lvl="0">
+              <a:defRPr sz="1800">
+                <a:solidFill>
+                  <a:srgbClr val="000000"/>
+                </a:solidFill>
+              </a:defRPr>
+            </a:pPr>
+            <a:r>
+              <a:rPr sz="3000">
+                <a:solidFill>
+                  <a:srgbClr val="FFFB00"/>
+                </a:solidFill>
+              </a:rPr>
+              <a:t>SpaceTag</a:t>
+            </a:r>
+          </a:p>
+        </p:txBody>
+      </p:sp>
+      <p:sp>
+        <p:nvSpPr>
+          <p:cNvPr id="58" name="Shape 58"/>
+          <p:cNvSpPr/>
+          <p:nvPr>
+            <p:ph type="body" idx="1"/>
+          </p:nvPr>
+        </p:nvSpPr>
+        <p:spPr>
+          <a:xfrm>
+            <a:off x="952500" y="2590800"/>
+            <a:ext cx="11099800" cy="6286500"/>
+          </a:xfrm>
+          <a:prstGeom prst="rect">
+            <a:avLst/>
+          </a:prstGeom>
+        </p:spPr>
+        <p:txBody>
+          <a:bodyPr/>
+          <a:lstStyle/>
+          <a:p>
+            <a:pPr lvl="0" marL="938388" indent="-938388">
+              <a:buSzPct val="50000"/>
+              <a:buBlip>
+                <a:blip r:embed="rId2"/>
+              </a:buBlip>
+              <a:defRPr sz="1800">
+                <a:solidFill>
+                  <a:srgbClr val="000000"/>
+                </a:solidFill>
+              </a:defRPr>
+            </a:pPr>
+            <a:r>
+              <a:rPr sz="3800">
+                <a:solidFill>
+                  <a:srgbClr val="FFFFFF"/>
+                </a:solidFill>
+              </a:rPr>
+              <a:t>Creative visualization of the data from </a:t>
+            </a:r>
+            <a:r>
+              <a:rPr sz="3800">
+                <a:hlinkClick r:id="rId3" invalidUrl="" action="" tgtFrame="" tooltip="" history="1" highlightClick="0" endSnd="0"/>
+              </a:rPr>
+              <a:t>www.data.nasa.gov</a:t>
+            </a:r>
+            <a:r>
+              <a:rPr sz="3800">
+                <a:solidFill>
+                  <a:srgbClr val="FFFFFF"/>
+                </a:solidFill>
+              </a:rPr>
+              <a:t> in shape of constellations in space, which will illustrate the relations between key words and related tags from the same area of interest</a:t>
+            </a:r>
+          </a:p>
+        </p:txBody>
+      </p:sp>
+    </p:spTree>
+  </p:cSld>
+  <p:clrMapOvr>
+    <a:masterClrMapping/>
+  </p:clrMapOvr>
+  <p:transition spd="med" advClick="1"/>
+</p:sld>
+</file>
+
+<file path=ppt/slides/slide8.xml><?xml version="1.0" encoding="utf-8"?>
+<p:sld xmlns:a="http://schemas.openxmlformats.org/drawingml/2006/main" xmlns:r="http://schemas.openxmlformats.org/officeDocument/2006/relationships" xmlns:p="http://schemas.openxmlformats.org/presentationml/2006/main" showMasterSp="1" showMasterPhAnim="1">
+  <p:cSld>
+    <p:spTree>
+      <p:nvGrpSpPr>
+        <p:cNvPr id="1" name=""/>
+        <p:cNvGrpSpPr/>
+        <p:nvPr/>
+      </p:nvGrpSpPr>
+      <p:grpSpPr>
+        <a:xfrm>
+          <a:off x="0" y="0"/>
+          <a:ext cx="0" cy="0"/>
+          <a:chOff x="0" y="0"/>
+          <a:chExt cx="0" cy="0"/>
+        </a:xfrm>
+      </p:grpSpPr>
+      <p:sp>
+        <p:nvSpPr>
+          <p:cNvPr id="60" name="Shape 60"/>
+          <p:cNvSpPr/>
+          <p:nvPr>
+            <p:ph type="title"/>
+          </p:nvPr>
+        </p:nvSpPr>
+        <p:spPr>
+          <a:xfrm>
+            <a:off x="952500" y="254000"/>
+            <a:ext cx="11099800" cy="2159000"/>
+          </a:xfrm>
+          <a:prstGeom prst="rect">
+            <a:avLst/>
+          </a:prstGeom>
+        </p:spPr>
+        <p:txBody>
+          <a:bodyPr/>
+          <a:lstStyle>
+            <a:lvl1pPr>
+              <a:defRPr sz="10000">
+                <a:solidFill>
+                  <a:srgbClr val="FFFB00"/>
+                </a:solidFill>
+                <a:latin typeface="Lithos Pro Black"/>
+                <a:ea typeface="Lithos Pro Black"/>
+                <a:cs typeface="Lithos Pro Black"/>
+                <a:sym typeface="Lithos Pro Black"/>
+              </a:defRPr>
+            </a:lvl1pPr>
+          </a:lstStyle>
+          <a:p>
+            <a:pPr lvl="0">
+              <a:defRPr sz="1800">
+                <a:solidFill>
+                  <a:srgbClr val="000000"/>
+                </a:solidFill>
+              </a:defRPr>
+            </a:pPr>
+            <a:r>
+              <a:rPr sz="10000">
+                <a:solidFill>
+                  <a:srgbClr val="FFFB00"/>
+                </a:solidFill>
+              </a:rPr>
+              <a:t>Product</a:t>
+            </a:r>
+          </a:p>
+        </p:txBody>
+      </p:sp>
+      <p:sp>
+        <p:nvSpPr>
+          <p:cNvPr id="61" name="Shape 61"/>
+          <p:cNvSpPr/>
+          <p:nvPr/>
+        </p:nvSpPr>
+        <p:spPr>
+          <a:xfrm>
+            <a:off x="8913151" y="9215966"/>
+            <a:ext cx="5865417" cy="554900"/>
+          </a:xfrm>
+          <a:prstGeom prst="rect">
+            <a:avLst/>
+          </a:prstGeom>
+          <a:ln w="12700">
+            <a:miter lim="400000"/>
+          </a:ln>
+          <a:extLst>
+            <a:ext uri="{C572A759-6A51-4108-AA02-DFA0A04FC94B}">
+              <ma14:wrappingTextBoxFlag xmlns:ma14="http://schemas.microsoft.com/office/mac/drawingml/2011/main" val="1"/>
+            </a:ext>
+          </a:extLst>
+        </p:spPr>
+        <p:txBody>
+          <a:bodyPr lIns="0" tIns="0" rIns="0" bIns="0" anchor="b">
+            <a:normAutofit fontScale="100000" lnSpcReduction="0"/>
+          </a:bodyPr>
+          <a:lstStyle>
+            <a:lvl1pPr>
+              <a:defRPr sz="3000">
+                <a:solidFill>
+                  <a:srgbClr val="FFFB00"/>
+                </a:solidFill>
+                <a:latin typeface="Lithos Pro Black"/>
+                <a:ea typeface="Lithos Pro Black"/>
+                <a:cs typeface="Lithos Pro Black"/>
+                <a:sym typeface="Lithos Pro Black"/>
+              </a:defRPr>
+            </a:lvl1pPr>
+          </a:lstStyle>
+          <a:p>
+            <a:pPr lvl="0">
+              <a:defRPr sz="1800">
+                <a:solidFill>
+                  <a:srgbClr val="000000"/>
+                </a:solidFill>
+              </a:defRPr>
+            </a:pPr>
+            <a:r>
+              <a:rPr sz="3000">
+                <a:solidFill>
+                  <a:srgbClr val="FFFB00"/>
+                </a:solidFill>
+              </a:rPr>
+              <a:t>SpaceTag</a:t>
+            </a:r>
+          </a:p>
+        </p:txBody>
+      </p:sp>
+      <p:sp>
+        <p:nvSpPr>
+          <p:cNvPr id="62" name="Shape 62"/>
+          <p:cNvSpPr/>
+          <p:nvPr>
+            <p:ph type="body" idx="1"/>
+          </p:nvPr>
+        </p:nvSpPr>
+        <p:spPr>
+          <a:xfrm>
+            <a:off x="952500" y="2590800"/>
+            <a:ext cx="11099800" cy="6286500"/>
+          </a:xfrm>
+          <a:prstGeom prst="rect">
+            <a:avLst/>
+          </a:prstGeom>
+        </p:spPr>
+        <p:txBody>
+          <a:bodyPr/>
+          <a:lstStyle/>
+          <a:p>
+            <a:pPr lvl="0" marL="938388" indent="-938388">
+              <a:buSzPct val="50000"/>
+              <a:buBlip>
+                <a:blip r:embed="rId2"/>
+              </a:buBlip>
+              <a:defRPr sz="1800">
+                <a:solidFill>
+                  <a:srgbClr val="000000"/>
+                </a:solidFill>
+              </a:defRPr>
+            </a:pPr>
+            <a:r>
+              <a:rPr sz="3800">
+                <a:solidFill>
+                  <a:srgbClr val="FFFFFF"/>
+                </a:solidFill>
+              </a:rPr>
+              <a:t>Finished product</a:t>
+            </a:r>
+            <a:endParaRPr sz="3800">
+              <a:solidFill>
+                <a:srgbClr val="FFFFFF"/>
+              </a:solidFill>
+            </a:endParaRPr>
+          </a:p>
+          <a:p>
+            <a:pPr lvl="0" marL="938388" indent="-938388">
+              <a:buSzPct val="50000"/>
+              <a:buBlip>
+                <a:blip r:embed="rId2"/>
+              </a:buBlip>
+              <a:defRPr sz="1800">
+                <a:solidFill>
+                  <a:srgbClr val="000000"/>
+                </a:solidFill>
+              </a:defRPr>
+            </a:pPr>
+            <a:r>
+              <a:rPr sz="3800">
+                <a:solidFill>
+                  <a:srgbClr val="FFFFFF"/>
+                </a:solidFill>
+              </a:rPr>
+              <a:t>Will be available for general use on a public domain</a:t>
+            </a:r>
+            <a:endParaRPr sz="3800">
+              <a:solidFill>
+                <a:srgbClr val="FFFFFF"/>
+              </a:solidFill>
+            </a:endParaRPr>
+          </a:p>
+          <a:p>
+            <a:pPr lvl="0" marL="938388" indent="-938388">
+              <a:buSzPct val="50000"/>
+              <a:buBlip>
+                <a:blip r:embed="rId2"/>
+              </a:buBlip>
+              <a:defRPr sz="1800">
+                <a:solidFill>
+                  <a:srgbClr val="000000"/>
+                </a:solidFill>
+              </a:defRPr>
+            </a:pPr>
+            <a:r>
+              <a:rPr sz="3800">
+                <a:solidFill>
+                  <a:srgbClr val="FFFFFF"/>
+                </a:solidFill>
+              </a:rPr>
+              <a:t>UI/UX improvements are possible</a:t>
+            </a:r>
+          </a:p>
+        </p:txBody>
+      </p:sp>
+    </p:spTree>
+  </p:cSld>
+  <p:clrMapOvr>
+    <a:masterClrMapping/>
+  </p:clrMapOvr>
+  <p:transition spd="med" advClick="1"/>
+</p:sld>
+</file>
+
+<file path=ppt/slides/slide9.xml><?xml version="1.0" encoding="utf-8"?>
+<p:sld xmlns:a="http://schemas.openxmlformats.org/drawingml/2006/main" xmlns:r="http://schemas.openxmlformats.org/officeDocument/2006/relationships" xmlns:p="http://schemas.openxmlformats.org/presentationml/2006/main" showMasterSp="1" showMasterPhAnim="1">
+  <p:cSld>
+    <p:spTree>
+      <p:nvGrpSpPr>
+        <p:cNvPr id="1" name=""/>
+        <p:cNvGrpSpPr/>
+        <p:nvPr/>
+      </p:nvGrpSpPr>
+      <p:grpSpPr>
+        <a:xfrm>
+          <a:off x="0" y="0"/>
+          <a:ext cx="0" cy="0"/>
+          <a:chOff x="0" y="0"/>
+          <a:chExt cx="0" cy="0"/>
+        </a:xfrm>
+      </p:grpSpPr>
+      <p:sp>
+        <p:nvSpPr>
+          <p:cNvPr id="64" name="Shape 64"/>
+          <p:cNvSpPr/>
+          <p:nvPr>
+            <p:ph type="title"/>
+          </p:nvPr>
+        </p:nvSpPr>
+        <p:spPr>
+          <a:xfrm>
+            <a:off x="952500" y="254000"/>
+            <a:ext cx="11099800" cy="2159000"/>
+          </a:xfrm>
+          <a:prstGeom prst="rect">
+            <a:avLst/>
+          </a:prstGeom>
+        </p:spPr>
+        <p:txBody>
+          <a:bodyPr/>
+          <a:lstStyle>
+            <a:lvl1pPr>
+              <a:defRPr sz="10000">
+                <a:solidFill>
+                  <a:srgbClr val="FFFB00"/>
+                </a:solidFill>
+                <a:latin typeface="Lithos Pro Black"/>
+                <a:ea typeface="Lithos Pro Black"/>
+                <a:cs typeface="Lithos Pro Black"/>
+                <a:sym typeface="Lithos Pro Black"/>
+              </a:defRPr>
+            </a:lvl1pPr>
+          </a:lstStyle>
+          <a:p>
+            <a:pPr lvl="0">
+              <a:defRPr sz="1800">
+                <a:solidFill>
+                  <a:srgbClr val="000000"/>
+                </a:solidFill>
+              </a:defRPr>
+            </a:pPr>
+            <a:r>
+              <a:rPr sz="10000">
+                <a:solidFill>
+                  <a:srgbClr val="FFFB00"/>
+                </a:solidFill>
+              </a:rPr>
+              <a:t>Sustainability</a:t>
+            </a:r>
+          </a:p>
+        </p:txBody>
+      </p:sp>
+      <p:sp>
+        <p:nvSpPr>
+          <p:cNvPr id="65" name="Shape 65"/>
+          <p:cNvSpPr/>
+          <p:nvPr>
+            <p:ph type="body" idx="1"/>
+          </p:nvPr>
+        </p:nvSpPr>
+        <p:spPr>
+          <a:xfrm>
+            <a:off x="952500" y="2590800"/>
+            <a:ext cx="11099800" cy="6286500"/>
+          </a:xfrm>
+          <a:prstGeom prst="rect">
+            <a:avLst/>
+          </a:prstGeom>
+        </p:spPr>
+        <p:txBody>
+          <a:bodyPr/>
+          <a:lstStyle/>
+          <a:p>
+            <a:pPr lvl="0" marL="938388" indent="-938388">
+              <a:buSzPct val="50000"/>
+              <a:buBlip>
+                <a:blip r:embed="rId2"/>
+              </a:buBlip>
+              <a:defRPr sz="1800">
+                <a:solidFill>
+                  <a:srgbClr val="000000"/>
+                </a:solidFill>
+              </a:defRPr>
+            </a:pPr>
+            <a:r>
+              <a:rPr sz="3800">
+                <a:solidFill>
+                  <a:srgbClr val="FFFFFF"/>
+                </a:solidFill>
+              </a:rPr>
+              <a:t>Open Source and Free</a:t>
+            </a:r>
+            <a:endParaRPr sz="3800">
+              <a:solidFill>
+                <a:srgbClr val="FFFFFF"/>
+              </a:solidFill>
+            </a:endParaRPr>
+          </a:p>
+          <a:p>
+            <a:pPr lvl="0" marL="938388" indent="-938388">
+              <a:buSzPct val="50000"/>
+              <a:buBlip>
+                <a:blip r:embed="rId2"/>
+              </a:buBlip>
+              <a:defRPr sz="1800">
+                <a:solidFill>
+                  <a:srgbClr val="000000"/>
+                </a:solidFill>
+              </a:defRPr>
+            </a:pPr>
+            <a:r>
+              <a:rPr sz="3800">
+                <a:solidFill>
+                  <a:srgbClr val="FFFFFF"/>
+                </a:solidFill>
+              </a:rPr>
+              <a:t>Automated keyword extraction and updates ensure that data stays fresh</a:t>
+            </a:r>
+          </a:p>
+        </p:txBody>
+      </p:sp>
+      <p:sp>
+        <p:nvSpPr>
+          <p:cNvPr id="66" name="Shape 66"/>
+          <p:cNvSpPr/>
+          <p:nvPr/>
+        </p:nvSpPr>
+        <p:spPr>
+          <a:xfrm>
+            <a:off x="8913151" y="9215966"/>
+            <a:ext cx="5865417" cy="554900"/>
+          </a:xfrm>
+          <a:prstGeom prst="rect">
+            <a:avLst/>
+          </a:prstGeom>
+          <a:ln w="12700">
+            <a:miter lim="400000"/>
+          </a:ln>
+          <a:extLst>
+            <a:ext uri="{C572A759-6A51-4108-AA02-DFA0A04FC94B}">
+              <ma14:wrappingTextBoxFlag xmlns:ma14="http://schemas.microsoft.com/office/mac/drawingml/2011/main" val="1"/>
+            </a:ext>
+          </a:extLst>
+        </p:spPr>
+        <p:txBody>
+          <a:bodyPr lIns="0" tIns="0" rIns="0" bIns="0" anchor="b">
+            <a:normAutofit fontScale="100000" lnSpcReduction="0"/>
+          </a:bodyPr>
+          <a:lstStyle>
+            <a:lvl1pPr>
+              <a:defRPr sz="3000">
+                <a:solidFill>
+                  <a:srgbClr val="FFFB00"/>
+                </a:solidFill>
+                <a:latin typeface="Lithos Pro Black"/>
+                <a:ea typeface="Lithos Pro Black"/>
+                <a:cs typeface="Lithos Pro Black"/>
+                <a:sym typeface="Lithos Pro Black"/>
+              </a:defRPr>
+            </a:lvl1pPr>
+          </a:lstStyle>
+          <a:p>
+            <a:pPr lvl="0">
+              <a:defRPr sz="1800">
+                <a:solidFill>
+                  <a:srgbClr val="000000"/>
+                </a:solidFill>
+              </a:defRPr>
+            </a:pPr>
+            <a:r>
+              <a:rPr sz="3000">
+                <a:solidFill>
+                  <a:srgbClr val="FFFB00"/>
+                </a:solidFill>
+              </a:rPr>
+              <a:t>SpaceTag</a:t>
+            </a:r>
+          </a:p>
+        </p:txBody>
+      </p:sp>
     </p:spTree>
   </p:cSld>
   <p:clrMapOvr>
@@ -3358,20 +4709,20 @@
 </file>
 
 <file path=ppt/theme/theme1.xml><?xml version="1.0" encoding="utf-8"?>
-<a:theme xmlns:a="http://schemas.openxmlformats.org/drawingml/2006/main" xmlns:r="http://schemas.openxmlformats.org/officeDocument/2006/relationships" name="Black">
+<a:theme xmlns:a="http://schemas.openxmlformats.org/drawingml/2006/main" xmlns:r="http://schemas.openxmlformats.org/officeDocument/2006/relationships" name="Default">
   <a:themeElements>
-    <a:clrScheme name="Black">
+    <a:clrScheme name="Default">
       <a:dk1>
         <a:srgbClr val="000000"/>
       </a:dk1>
       <a:lt1>
-        <a:srgbClr val="FFFFFF"/>
+        <a:srgbClr val="000000"/>
       </a:lt1>
       <a:dk2>
-        <a:srgbClr val="53585F"/>
+        <a:srgbClr val="A7A7A7"/>
       </a:dk2>
       <a:lt2>
-        <a:srgbClr val="DCDEE0"/>
+        <a:srgbClr val="535353"/>
       </a:lt2>
       <a:accent1>
         <a:srgbClr val="0065C1"/>
@@ -3398,19 +4749,19 @@
         <a:srgbClr val="FF00FF"/>
       </a:folHlink>
     </a:clrScheme>
-    <a:fontScheme name="Black">
+    <a:fontScheme name="Default">
       <a:majorFont>
-        <a:latin typeface="Helvetica Light"/>
-        <a:ea typeface="Helvetica Light"/>
-        <a:cs typeface="Helvetica Light"/>
+        <a:latin typeface="Helvetica"/>
+        <a:ea typeface="Helvetica"/>
+        <a:cs typeface="Helvetica"/>
       </a:majorFont>
       <a:minorFont>
-        <a:latin typeface="Helvetica Light"/>
-        <a:ea typeface="Helvetica Light"/>
-        <a:cs typeface="Helvetica Light"/>
+        <a:latin typeface="Avenir Roman"/>
+        <a:ea typeface="Avenir Roman"/>
+        <a:cs typeface="Avenir Roman"/>
       </a:minorFont>
     </a:fontScheme>
-    <a:fmtScheme name="Black">
+    <a:fmtScheme name="Default">
       <a:fillStyleLst>
         <a:solidFill>
           <a:schemeClr val="phClr"/>
@@ -3547,14 +4898,15 @@
   <a:objectDefaults>
     <a:spDef>
       <a:spPr>
-        <a:blipFill rotWithShape="1">
-          <a:blip r:embed="rId1"/>
-          <a:srcRect l="0" t="0" r="0" b="0"/>
-          <a:tile tx="0" ty="0" sx="100000" sy="100000" flip="none" algn="tl"/>
-        </a:blipFill>
-        <a:ln w="12700" cap="flat">
-          <a:noFill/>
-          <a:miter lim="400000"/>
+        <a:solidFill>
+          <a:srgbClr val="FFFFFF"/>
+        </a:solidFill>
+        <a:ln w="25400" cap="flat">
+          <a:solidFill>
+            <a:srgbClr val="0065C1"/>
+          </a:solidFill>
+          <a:prstDash val="solid"/>
+          <a:bevel/>
         </a:ln>
         <a:effectLst/>
       </a:spPr>
@@ -3577,18 +4929,18 @@
           <a:buFontTx/>
           <a:buNone/>
           <a:tabLst/>
-          <a:defRPr b="0" baseline="0" cap="none" i="0" spc="0" strike="noStrike" sz="2600" u="none" kumimoji="0" normalizeH="0">
+          <a:defRPr b="0" baseline="0" cap="none" i="0" spc="0" strike="noStrike" sz="3600" u="none" kumimoji="0" normalizeH="0">
             <a:ln>
               <a:noFill/>
             </a:ln>
             <a:solidFill>
-              <a:srgbClr val="FFFFFF"/>
+              <a:srgbClr val="000000"/>
             </a:solidFill>
             <a:effectLst/>
             <a:uFillTx/>
-            <a:latin typeface="+mn-lt"/>
-            <a:ea typeface="+mn-ea"/>
-            <a:cs typeface="+mn-cs"/>
+            <a:latin typeface="Helvetica Light"/>
+            <a:ea typeface="Helvetica Light"/>
+            <a:cs typeface="Helvetica Light"/>
             <a:sym typeface="Helvetica Light"/>
           </a:defRPr>
         </a:defPPr>
@@ -3839,10 +5191,10 @@
         <a:noFill/>
         <a:ln w="25400" cap="flat">
           <a:solidFill>
-            <a:srgbClr val="FFFFFF"/>
+            <a:srgbClr val="0065C1"/>
           </a:solidFill>
           <a:prstDash val="solid"/>
-          <a:miter lim="400000"/>
+          <a:bevel/>
         </a:ln>
         <a:effectLst/>
       </a:spPr>
@@ -4151,13 +5503,13 @@
               <a:noFill/>
             </a:ln>
             <a:solidFill>
-              <a:srgbClr val="FFFFFF"/>
+              <a:srgbClr val="000000"/>
             </a:solidFill>
             <a:effectLst/>
             <a:uFillTx/>
-            <a:latin typeface="+mn-lt"/>
-            <a:ea typeface="+mn-ea"/>
-            <a:cs typeface="+mn-cs"/>
+            <a:latin typeface="Helvetica Light"/>
+            <a:ea typeface="Helvetica Light"/>
+            <a:cs typeface="Helvetica Light"/>
             <a:sym typeface="Helvetica Light"/>
           </a:defRPr>
         </a:defPPr>
@@ -4408,9 +5760,9 @@
 </file>
 
 <file path=ppt/theme/theme2.xml><?xml version="1.0" encoding="utf-8"?>
-<a:theme xmlns:a="http://schemas.openxmlformats.org/drawingml/2006/main" xmlns:r="http://schemas.openxmlformats.org/officeDocument/2006/relationships" name="Black">
+<a:theme xmlns:a="http://schemas.openxmlformats.org/drawingml/2006/main" xmlns:r="http://schemas.openxmlformats.org/officeDocument/2006/relationships" name="Default">
   <a:themeElements>
-    <a:clrScheme name="Black">
+    <a:clrScheme name="Default">
       <a:dk1>
         <a:srgbClr val="000000"/>
       </a:dk1>
@@ -4418,10 +5770,10 @@
         <a:srgbClr val="FFFFFF"/>
       </a:lt1>
       <a:dk2>
-        <a:srgbClr val="53585F"/>
+        <a:srgbClr val="A7A7A7"/>
       </a:dk2>
       <a:lt2>
-        <a:srgbClr val="DCDEE0"/>
+        <a:srgbClr val="535353"/>
       </a:lt2>
       <a:accent1>
         <a:srgbClr val="0065C1"/>
@@ -4448,19 +5800,19 @@
         <a:srgbClr val="FF00FF"/>
       </a:folHlink>
     </a:clrScheme>
-    <a:fontScheme name="Black">
+    <a:fontScheme name="Default">
       <a:majorFont>
-        <a:latin typeface="Helvetica Light"/>
-        <a:ea typeface="Helvetica Light"/>
-        <a:cs typeface="Helvetica Light"/>
+        <a:latin typeface="Helvetica"/>
+        <a:ea typeface="Helvetica"/>
+        <a:cs typeface="Helvetica"/>
       </a:majorFont>
       <a:minorFont>
-        <a:latin typeface="Helvetica Light"/>
-        <a:ea typeface="Helvetica Light"/>
-        <a:cs typeface="Helvetica Light"/>
+        <a:latin typeface="Avenir Roman"/>
+        <a:ea typeface="Avenir Roman"/>
+        <a:cs typeface="Avenir Roman"/>
       </a:minorFont>
     </a:fontScheme>
-    <a:fmtScheme name="Black">
+    <a:fmtScheme name="Default">
       <a:fillStyleLst>
         <a:solidFill>
           <a:schemeClr val="phClr"/>
@@ -4597,14 +5949,15 @@
   <a:objectDefaults>
     <a:spDef>
       <a:spPr>
-        <a:blipFill rotWithShape="1">
-          <a:blip r:embed="rId1"/>
-          <a:srcRect l="0" t="0" r="0" b="0"/>
-          <a:tile tx="0" ty="0" sx="100000" sy="100000" flip="none" algn="tl"/>
-        </a:blipFill>
-        <a:ln w="12700" cap="flat">
-          <a:noFill/>
-          <a:miter lim="400000"/>
+        <a:solidFill>
+          <a:srgbClr val="FFFFFF"/>
+        </a:solidFill>
+        <a:ln w="25400" cap="flat">
+          <a:solidFill>
+            <a:srgbClr val="0065C1"/>
+          </a:solidFill>
+          <a:prstDash val="solid"/>
+          <a:bevel/>
         </a:ln>
         <a:effectLst/>
       </a:spPr>
@@ -4627,18 +5980,18 @@
           <a:buFontTx/>
           <a:buNone/>
           <a:tabLst/>
-          <a:defRPr b="0" baseline="0" cap="none" i="0" spc="0" strike="noStrike" sz="2600" u="none" kumimoji="0" normalizeH="0">
+          <a:defRPr b="0" baseline="0" cap="none" i="0" spc="0" strike="noStrike" sz="3600" u="none" kumimoji="0" normalizeH="0">
             <a:ln>
               <a:noFill/>
             </a:ln>
             <a:solidFill>
-              <a:srgbClr val="FFFFFF"/>
+              <a:srgbClr val="000000"/>
             </a:solidFill>
             <a:effectLst/>
             <a:uFillTx/>
-            <a:latin typeface="+mn-lt"/>
-            <a:ea typeface="+mn-ea"/>
-            <a:cs typeface="+mn-cs"/>
+            <a:latin typeface="Helvetica Light"/>
+            <a:ea typeface="Helvetica Light"/>
+            <a:cs typeface="Helvetica Light"/>
             <a:sym typeface="Helvetica Light"/>
           </a:defRPr>
         </a:defPPr>
@@ -4889,10 +6242,10 @@
         <a:noFill/>
         <a:ln w="25400" cap="flat">
           <a:solidFill>
-            <a:srgbClr val="FFFFFF"/>
+            <a:srgbClr val="0065C1"/>
           </a:solidFill>
           <a:prstDash val="solid"/>
-          <a:miter lim="400000"/>
+          <a:bevel/>
         </a:ln>
         <a:effectLst/>
       </a:spPr>
@@ -5201,13 +6554,13 @@
               <a:noFill/>
             </a:ln>
             <a:solidFill>
-              <a:srgbClr val="FFFFFF"/>
+              <a:srgbClr val="000000"/>
             </a:solidFill>
             <a:effectLst/>
             <a:uFillTx/>
-            <a:latin typeface="+mn-lt"/>
-            <a:ea typeface="+mn-ea"/>
-            <a:cs typeface="+mn-cs"/>
+            <a:latin typeface="Helvetica Light"/>
+            <a:ea typeface="Helvetica Light"/>
+            <a:cs typeface="Helvetica Light"/>
             <a:sym typeface="Helvetica Light"/>
           </a:defRPr>
         </a:defPPr>

</xml_diff>